<commit_message>
edit cp8w, revise CP_build_MSTs to use 4x4-array figure
</commit_message>
<xml_diff>
--- a/fall15/slidesF15/4x4-array.pptx
+++ b/fall15/slidesF15/4x4-array.pptx
@@ -3097,1795 +3097,1810 @@
       </p:grpSpPr>
       <p:grpSp>
         <p:nvGrpSpPr>
-          <p:cNvPr id="43" name="Group 42"/>
+          <p:cNvPr id="2" name="Group 1"/>
           <p:cNvGrpSpPr/>
           <p:nvPr/>
         </p:nvGrpSpPr>
         <p:grpSpPr>
           <a:xfrm>
-            <a:off x="916898" y="685800"/>
-            <a:ext cx="7465102" cy="5421220"/>
-            <a:chOff x="3200400" y="1676400"/>
-            <a:chExt cx="2763105" cy="2754426"/>
+            <a:off x="17348" y="0"/>
+            <a:ext cx="8288452" cy="6477000"/>
+            <a:chOff x="474548" y="228600"/>
+            <a:chExt cx="7945552" cy="6248400"/>
           </a:xfrm>
         </p:grpSpPr>
-        <p:cxnSp>
-          <p:nvCxnSpPr>
-            <p:cNvPr id="14" name="Straight Connector 13"/>
-            <p:cNvCxnSpPr/>
+        <p:grpSp>
+          <p:nvGrpSpPr>
+            <p:cNvPr id="43" name="Group 42"/>
+            <p:cNvGrpSpPr/>
             <p:nvPr/>
-          </p:nvCxnSpPr>
+          </p:nvGrpSpPr>
+          <p:grpSpPr>
+            <a:xfrm>
+              <a:off x="1371600" y="762000"/>
+              <a:ext cx="6819995" cy="5715000"/>
+              <a:chOff x="3200400" y="1676400"/>
+              <a:chExt cx="2763105" cy="2754426"/>
+            </a:xfrm>
+          </p:grpSpPr>
+          <p:cxnSp>
+            <p:nvCxnSpPr>
+              <p:cNvPr id="14" name="Straight Connector 13"/>
+              <p:cNvCxnSpPr/>
+              <p:nvPr/>
+            </p:nvCxnSpPr>
+            <p:spPr>
+              <a:xfrm flipH="1">
+                <a:off x="3200400" y="1676400"/>
+                <a:ext cx="914400" cy="0"/>
+              </a:xfrm>
+              <a:prstGeom prst="line">
+                <a:avLst/>
+              </a:prstGeom>
+              <a:ln>
+                <a:solidFill>
+                  <a:schemeClr val="tx1"/>
+                </a:solidFill>
+                <a:headEnd type="oval"/>
+                <a:tailEnd type="oval"/>
+              </a:ln>
+            </p:spPr>
+            <p:style>
+              <a:lnRef idx="2">
+                <a:schemeClr val="accent1"/>
+              </a:lnRef>
+              <a:fillRef idx="0">
+                <a:schemeClr val="accent1"/>
+              </a:fillRef>
+              <a:effectRef idx="1">
+                <a:schemeClr val="accent1"/>
+              </a:effectRef>
+              <a:fontRef idx="minor">
+                <a:schemeClr val="tx1"/>
+              </a:fontRef>
+            </p:style>
+          </p:cxnSp>
+          <p:cxnSp>
+            <p:nvCxnSpPr>
+              <p:cNvPr id="17" name="Straight Connector 16"/>
+              <p:cNvCxnSpPr/>
+              <p:nvPr/>
+            </p:nvCxnSpPr>
+            <p:spPr>
+              <a:xfrm flipH="1">
+                <a:off x="4114800" y="1676400"/>
+                <a:ext cx="914400" cy="0"/>
+              </a:xfrm>
+              <a:prstGeom prst="line">
+                <a:avLst/>
+              </a:prstGeom>
+              <a:ln>
+                <a:solidFill>
+                  <a:schemeClr val="tx1"/>
+                </a:solidFill>
+                <a:headEnd type="oval"/>
+                <a:tailEnd type="oval"/>
+              </a:ln>
+            </p:spPr>
+            <p:style>
+              <a:lnRef idx="2">
+                <a:schemeClr val="accent1"/>
+              </a:lnRef>
+              <a:fillRef idx="0">
+                <a:schemeClr val="accent1"/>
+              </a:fillRef>
+              <a:effectRef idx="1">
+                <a:schemeClr val="accent1"/>
+              </a:effectRef>
+              <a:fontRef idx="minor">
+                <a:schemeClr val="tx1"/>
+              </a:fontRef>
+            </p:style>
+          </p:cxnSp>
+          <p:cxnSp>
+            <p:nvCxnSpPr>
+              <p:cNvPr id="18" name="Straight Connector 17"/>
+              <p:cNvCxnSpPr/>
+              <p:nvPr/>
+            </p:nvCxnSpPr>
+            <p:spPr>
+              <a:xfrm flipH="1">
+                <a:off x="5029200" y="1676400"/>
+                <a:ext cx="914400" cy="0"/>
+              </a:xfrm>
+              <a:prstGeom prst="line">
+                <a:avLst/>
+              </a:prstGeom>
+              <a:ln>
+                <a:solidFill>
+                  <a:schemeClr val="tx1"/>
+                </a:solidFill>
+                <a:headEnd type="oval"/>
+                <a:tailEnd type="oval"/>
+              </a:ln>
+            </p:spPr>
+            <p:style>
+              <a:lnRef idx="2">
+                <a:schemeClr val="accent1"/>
+              </a:lnRef>
+              <a:fillRef idx="0">
+                <a:schemeClr val="accent1"/>
+              </a:fillRef>
+              <a:effectRef idx="1">
+                <a:schemeClr val="accent1"/>
+              </a:effectRef>
+              <a:fontRef idx="minor">
+                <a:schemeClr val="tx1"/>
+              </a:fontRef>
+            </p:style>
+          </p:cxnSp>
+          <p:cxnSp>
+            <p:nvCxnSpPr>
+              <p:cNvPr id="19" name="Straight Connector 18"/>
+              <p:cNvCxnSpPr/>
+              <p:nvPr/>
+            </p:nvCxnSpPr>
+            <p:spPr>
+              <a:xfrm flipV="1">
+                <a:off x="3200400" y="1676401"/>
+                <a:ext cx="0" cy="914399"/>
+              </a:xfrm>
+              <a:prstGeom prst="line">
+                <a:avLst/>
+              </a:prstGeom>
+              <a:ln>
+                <a:solidFill>
+                  <a:schemeClr val="tx1"/>
+                </a:solidFill>
+                <a:headEnd type="oval"/>
+                <a:tailEnd type="oval"/>
+              </a:ln>
+            </p:spPr>
+            <p:style>
+              <a:lnRef idx="2">
+                <a:schemeClr val="accent1"/>
+              </a:lnRef>
+              <a:fillRef idx="0">
+                <a:schemeClr val="accent1"/>
+              </a:fillRef>
+              <a:effectRef idx="1">
+                <a:schemeClr val="accent1"/>
+              </a:effectRef>
+              <a:fontRef idx="minor">
+                <a:schemeClr val="tx1"/>
+              </a:fontRef>
+            </p:style>
+          </p:cxnSp>
+          <p:cxnSp>
+            <p:nvCxnSpPr>
+              <p:cNvPr id="23" name="Straight Connector 22"/>
+              <p:cNvCxnSpPr/>
+              <p:nvPr/>
+            </p:nvCxnSpPr>
+            <p:spPr>
+              <a:xfrm flipV="1">
+                <a:off x="3200400" y="2590800"/>
+                <a:ext cx="0" cy="914399"/>
+              </a:xfrm>
+              <a:prstGeom prst="line">
+                <a:avLst/>
+              </a:prstGeom>
+              <a:ln>
+                <a:solidFill>
+                  <a:schemeClr val="tx1"/>
+                </a:solidFill>
+                <a:headEnd type="oval"/>
+                <a:tailEnd type="oval"/>
+              </a:ln>
+            </p:spPr>
+            <p:style>
+              <a:lnRef idx="2">
+                <a:schemeClr val="accent1"/>
+              </a:lnRef>
+              <a:fillRef idx="0">
+                <a:schemeClr val="accent1"/>
+              </a:fillRef>
+              <a:effectRef idx="1">
+                <a:schemeClr val="accent1"/>
+              </a:effectRef>
+              <a:fontRef idx="minor">
+                <a:schemeClr val="tx1"/>
+              </a:fontRef>
+            </p:style>
+          </p:cxnSp>
+          <p:cxnSp>
+            <p:nvCxnSpPr>
+              <p:cNvPr id="24" name="Straight Connector 23"/>
+              <p:cNvCxnSpPr/>
+              <p:nvPr/>
+            </p:nvCxnSpPr>
+            <p:spPr>
+              <a:xfrm flipV="1">
+                <a:off x="3200400" y="3505199"/>
+                <a:ext cx="0" cy="914399"/>
+              </a:xfrm>
+              <a:prstGeom prst="line">
+                <a:avLst/>
+              </a:prstGeom>
+              <a:ln>
+                <a:solidFill>
+                  <a:schemeClr val="tx1"/>
+                </a:solidFill>
+                <a:headEnd type="oval"/>
+                <a:tailEnd type="oval"/>
+              </a:ln>
+            </p:spPr>
+            <p:style>
+              <a:lnRef idx="2">
+                <a:schemeClr val="accent1"/>
+              </a:lnRef>
+              <a:fillRef idx="0">
+                <a:schemeClr val="accent1"/>
+              </a:fillRef>
+              <a:effectRef idx="1">
+                <a:schemeClr val="accent1"/>
+              </a:effectRef>
+              <a:fontRef idx="minor">
+                <a:schemeClr val="tx1"/>
+              </a:fontRef>
+            </p:style>
+          </p:cxnSp>
+          <p:cxnSp>
+            <p:nvCxnSpPr>
+              <p:cNvPr id="25" name="Straight Connector 24"/>
+              <p:cNvCxnSpPr/>
+              <p:nvPr/>
+            </p:nvCxnSpPr>
+            <p:spPr>
+              <a:xfrm flipH="1">
+                <a:off x="3200400" y="2605581"/>
+                <a:ext cx="914400" cy="0"/>
+              </a:xfrm>
+              <a:prstGeom prst="line">
+                <a:avLst/>
+              </a:prstGeom>
+              <a:ln>
+                <a:solidFill>
+                  <a:schemeClr val="tx1"/>
+                </a:solidFill>
+                <a:headEnd type="oval"/>
+                <a:tailEnd type="oval"/>
+              </a:ln>
+            </p:spPr>
+            <p:style>
+              <a:lnRef idx="2">
+                <a:schemeClr val="accent1"/>
+              </a:lnRef>
+              <a:fillRef idx="0">
+                <a:schemeClr val="accent1"/>
+              </a:fillRef>
+              <a:effectRef idx="1">
+                <a:schemeClr val="accent1"/>
+              </a:effectRef>
+              <a:fontRef idx="minor">
+                <a:schemeClr val="tx1"/>
+              </a:fontRef>
+            </p:style>
+          </p:cxnSp>
+          <p:cxnSp>
+            <p:nvCxnSpPr>
+              <p:cNvPr id="26" name="Straight Connector 25"/>
+              <p:cNvCxnSpPr/>
+              <p:nvPr/>
+            </p:nvCxnSpPr>
+            <p:spPr>
+              <a:xfrm flipH="1">
+                <a:off x="4114800" y="2605581"/>
+                <a:ext cx="914400" cy="0"/>
+              </a:xfrm>
+              <a:prstGeom prst="line">
+                <a:avLst/>
+              </a:prstGeom>
+              <a:ln>
+                <a:solidFill>
+                  <a:schemeClr val="tx1"/>
+                </a:solidFill>
+                <a:headEnd type="oval"/>
+                <a:tailEnd type="oval"/>
+              </a:ln>
+            </p:spPr>
+            <p:style>
+              <a:lnRef idx="2">
+                <a:schemeClr val="accent1"/>
+              </a:lnRef>
+              <a:fillRef idx="0">
+                <a:schemeClr val="accent1"/>
+              </a:fillRef>
+              <a:effectRef idx="1">
+                <a:schemeClr val="accent1"/>
+              </a:effectRef>
+              <a:fontRef idx="minor">
+                <a:schemeClr val="tx1"/>
+              </a:fontRef>
+            </p:style>
+          </p:cxnSp>
+          <p:cxnSp>
+            <p:nvCxnSpPr>
+              <p:cNvPr id="27" name="Straight Connector 26"/>
+              <p:cNvCxnSpPr/>
+              <p:nvPr/>
+            </p:nvCxnSpPr>
+            <p:spPr>
+              <a:xfrm flipH="1">
+                <a:off x="5029200" y="2605581"/>
+                <a:ext cx="914400" cy="0"/>
+              </a:xfrm>
+              <a:prstGeom prst="line">
+                <a:avLst/>
+              </a:prstGeom>
+              <a:ln>
+                <a:solidFill>
+                  <a:schemeClr val="tx1"/>
+                </a:solidFill>
+                <a:headEnd type="oval"/>
+                <a:tailEnd type="oval"/>
+              </a:ln>
+            </p:spPr>
+            <p:style>
+              <a:lnRef idx="2">
+                <a:schemeClr val="accent1"/>
+              </a:lnRef>
+              <a:fillRef idx="0">
+                <a:schemeClr val="accent1"/>
+              </a:fillRef>
+              <a:effectRef idx="1">
+                <a:schemeClr val="accent1"/>
+              </a:effectRef>
+              <a:fontRef idx="minor">
+                <a:schemeClr val="tx1"/>
+              </a:fontRef>
+            </p:style>
+          </p:cxnSp>
+          <p:cxnSp>
+            <p:nvCxnSpPr>
+              <p:cNvPr id="28" name="Straight Connector 27"/>
+              <p:cNvCxnSpPr/>
+              <p:nvPr/>
+            </p:nvCxnSpPr>
+            <p:spPr>
+              <a:xfrm flipH="1">
+                <a:off x="3220305" y="3520475"/>
+                <a:ext cx="914400" cy="0"/>
+              </a:xfrm>
+              <a:prstGeom prst="line">
+                <a:avLst/>
+              </a:prstGeom>
+              <a:ln>
+                <a:solidFill>
+                  <a:schemeClr val="tx1"/>
+                </a:solidFill>
+                <a:headEnd type="oval"/>
+                <a:tailEnd type="oval"/>
+              </a:ln>
+            </p:spPr>
+            <p:style>
+              <a:lnRef idx="2">
+                <a:schemeClr val="accent1"/>
+              </a:lnRef>
+              <a:fillRef idx="0">
+                <a:schemeClr val="accent1"/>
+              </a:fillRef>
+              <a:effectRef idx="1">
+                <a:schemeClr val="accent1"/>
+              </a:effectRef>
+              <a:fontRef idx="minor">
+                <a:schemeClr val="tx1"/>
+              </a:fontRef>
+            </p:style>
+          </p:cxnSp>
+          <p:cxnSp>
+            <p:nvCxnSpPr>
+              <p:cNvPr id="29" name="Straight Connector 28"/>
+              <p:cNvCxnSpPr/>
+              <p:nvPr/>
+            </p:nvCxnSpPr>
+            <p:spPr>
+              <a:xfrm flipH="1">
+                <a:off x="4134705" y="3520475"/>
+                <a:ext cx="914400" cy="0"/>
+              </a:xfrm>
+              <a:prstGeom prst="line">
+                <a:avLst/>
+              </a:prstGeom>
+              <a:ln>
+                <a:solidFill>
+                  <a:schemeClr val="tx1"/>
+                </a:solidFill>
+                <a:headEnd type="oval"/>
+                <a:tailEnd type="oval"/>
+              </a:ln>
+            </p:spPr>
+            <p:style>
+              <a:lnRef idx="2">
+                <a:schemeClr val="accent1"/>
+              </a:lnRef>
+              <a:fillRef idx="0">
+                <a:schemeClr val="accent1"/>
+              </a:fillRef>
+              <a:effectRef idx="1">
+                <a:schemeClr val="accent1"/>
+              </a:effectRef>
+              <a:fontRef idx="minor">
+                <a:schemeClr val="tx1"/>
+              </a:fontRef>
+            </p:style>
+          </p:cxnSp>
+          <p:cxnSp>
+            <p:nvCxnSpPr>
+              <p:cNvPr id="30" name="Straight Connector 29"/>
+              <p:cNvCxnSpPr/>
+              <p:nvPr/>
+            </p:nvCxnSpPr>
+            <p:spPr>
+              <a:xfrm flipH="1">
+                <a:off x="5049105" y="3520475"/>
+                <a:ext cx="914400" cy="0"/>
+              </a:xfrm>
+              <a:prstGeom prst="line">
+                <a:avLst/>
+              </a:prstGeom>
+              <a:ln>
+                <a:solidFill>
+                  <a:schemeClr val="tx1"/>
+                </a:solidFill>
+                <a:headEnd type="oval"/>
+                <a:tailEnd type="oval"/>
+              </a:ln>
+            </p:spPr>
+            <p:style>
+              <a:lnRef idx="2">
+                <a:schemeClr val="accent1"/>
+              </a:lnRef>
+              <a:fillRef idx="0">
+                <a:schemeClr val="accent1"/>
+              </a:fillRef>
+              <a:effectRef idx="1">
+                <a:schemeClr val="accent1"/>
+              </a:effectRef>
+              <a:fontRef idx="minor">
+                <a:schemeClr val="tx1"/>
+              </a:fontRef>
+            </p:style>
+          </p:cxnSp>
+          <p:cxnSp>
+            <p:nvCxnSpPr>
+              <p:cNvPr id="31" name="Straight Connector 30"/>
+              <p:cNvCxnSpPr/>
+              <p:nvPr/>
+            </p:nvCxnSpPr>
+            <p:spPr>
+              <a:xfrm flipH="1">
+                <a:off x="3213670" y="4430826"/>
+                <a:ext cx="914400" cy="0"/>
+              </a:xfrm>
+              <a:prstGeom prst="line">
+                <a:avLst/>
+              </a:prstGeom>
+              <a:ln>
+                <a:solidFill>
+                  <a:schemeClr val="tx1"/>
+                </a:solidFill>
+                <a:headEnd type="oval"/>
+                <a:tailEnd type="oval"/>
+              </a:ln>
+            </p:spPr>
+            <p:style>
+              <a:lnRef idx="2">
+                <a:schemeClr val="accent1"/>
+              </a:lnRef>
+              <a:fillRef idx="0">
+                <a:schemeClr val="accent1"/>
+              </a:fillRef>
+              <a:effectRef idx="1">
+                <a:schemeClr val="accent1"/>
+              </a:effectRef>
+              <a:fontRef idx="minor">
+                <a:schemeClr val="tx1"/>
+              </a:fontRef>
+            </p:style>
+          </p:cxnSp>
+          <p:cxnSp>
+            <p:nvCxnSpPr>
+              <p:cNvPr id="32" name="Straight Connector 31"/>
+              <p:cNvCxnSpPr/>
+              <p:nvPr/>
+            </p:nvCxnSpPr>
+            <p:spPr>
+              <a:xfrm flipH="1">
+                <a:off x="4128070" y="4430826"/>
+                <a:ext cx="914400" cy="0"/>
+              </a:xfrm>
+              <a:prstGeom prst="line">
+                <a:avLst/>
+              </a:prstGeom>
+              <a:ln>
+                <a:solidFill>
+                  <a:schemeClr val="tx1"/>
+                </a:solidFill>
+                <a:headEnd type="oval"/>
+                <a:tailEnd type="oval"/>
+              </a:ln>
+            </p:spPr>
+            <p:style>
+              <a:lnRef idx="2">
+                <a:schemeClr val="accent1"/>
+              </a:lnRef>
+              <a:fillRef idx="0">
+                <a:schemeClr val="accent1"/>
+              </a:fillRef>
+              <a:effectRef idx="1">
+                <a:schemeClr val="accent1"/>
+              </a:effectRef>
+              <a:fontRef idx="minor">
+                <a:schemeClr val="tx1"/>
+              </a:fontRef>
+            </p:style>
+          </p:cxnSp>
+          <p:cxnSp>
+            <p:nvCxnSpPr>
+              <p:cNvPr id="33" name="Straight Connector 32"/>
+              <p:cNvCxnSpPr/>
+              <p:nvPr/>
+            </p:nvCxnSpPr>
+            <p:spPr>
+              <a:xfrm flipH="1">
+                <a:off x="5042470" y="4430826"/>
+                <a:ext cx="914400" cy="0"/>
+              </a:xfrm>
+              <a:prstGeom prst="line">
+                <a:avLst/>
+              </a:prstGeom>
+              <a:ln>
+                <a:solidFill>
+                  <a:schemeClr val="tx1"/>
+                </a:solidFill>
+                <a:headEnd type="oval"/>
+                <a:tailEnd type="oval"/>
+              </a:ln>
+            </p:spPr>
+            <p:style>
+              <a:lnRef idx="2">
+                <a:schemeClr val="accent1"/>
+              </a:lnRef>
+              <a:fillRef idx="0">
+                <a:schemeClr val="accent1"/>
+              </a:fillRef>
+              <a:effectRef idx="1">
+                <a:schemeClr val="accent1"/>
+              </a:effectRef>
+              <a:fontRef idx="minor">
+                <a:schemeClr val="tx1"/>
+              </a:fontRef>
+            </p:style>
+          </p:cxnSp>
+          <p:cxnSp>
+            <p:nvCxnSpPr>
+              <p:cNvPr id="34" name="Straight Connector 33"/>
+              <p:cNvCxnSpPr/>
+              <p:nvPr/>
+            </p:nvCxnSpPr>
+            <p:spPr>
+              <a:xfrm flipV="1">
+                <a:off x="4121435" y="1676401"/>
+                <a:ext cx="0" cy="914399"/>
+              </a:xfrm>
+              <a:prstGeom prst="line">
+                <a:avLst/>
+              </a:prstGeom>
+              <a:ln>
+                <a:solidFill>
+                  <a:schemeClr val="tx1"/>
+                </a:solidFill>
+                <a:headEnd type="oval"/>
+                <a:tailEnd type="oval"/>
+              </a:ln>
+            </p:spPr>
+            <p:style>
+              <a:lnRef idx="2">
+                <a:schemeClr val="accent1"/>
+              </a:lnRef>
+              <a:fillRef idx="0">
+                <a:schemeClr val="accent1"/>
+              </a:fillRef>
+              <a:effectRef idx="1">
+                <a:schemeClr val="accent1"/>
+              </a:effectRef>
+              <a:fontRef idx="minor">
+                <a:schemeClr val="tx1"/>
+              </a:fontRef>
+            </p:style>
+          </p:cxnSp>
+          <p:cxnSp>
+            <p:nvCxnSpPr>
+              <p:cNvPr id="35" name="Straight Connector 34"/>
+              <p:cNvCxnSpPr/>
+              <p:nvPr/>
+            </p:nvCxnSpPr>
+            <p:spPr>
+              <a:xfrm flipV="1">
+                <a:off x="4121435" y="2590800"/>
+                <a:ext cx="0" cy="914399"/>
+              </a:xfrm>
+              <a:prstGeom prst="line">
+                <a:avLst/>
+              </a:prstGeom>
+              <a:ln>
+                <a:solidFill>
+                  <a:schemeClr val="tx1"/>
+                </a:solidFill>
+                <a:headEnd type="oval"/>
+                <a:tailEnd type="oval"/>
+              </a:ln>
+            </p:spPr>
+            <p:style>
+              <a:lnRef idx="2">
+                <a:schemeClr val="accent1"/>
+              </a:lnRef>
+              <a:fillRef idx="0">
+                <a:schemeClr val="accent1"/>
+              </a:fillRef>
+              <a:effectRef idx="1">
+                <a:schemeClr val="accent1"/>
+              </a:effectRef>
+              <a:fontRef idx="minor">
+                <a:schemeClr val="tx1"/>
+              </a:fontRef>
+            </p:style>
+          </p:cxnSp>
+          <p:cxnSp>
+            <p:nvCxnSpPr>
+              <p:cNvPr id="36" name="Straight Connector 35"/>
+              <p:cNvCxnSpPr/>
+              <p:nvPr/>
+            </p:nvCxnSpPr>
+            <p:spPr>
+              <a:xfrm flipV="1">
+                <a:off x="4121435" y="3505199"/>
+                <a:ext cx="0" cy="914399"/>
+              </a:xfrm>
+              <a:prstGeom prst="line">
+                <a:avLst/>
+              </a:prstGeom>
+              <a:ln>
+                <a:solidFill>
+                  <a:schemeClr val="tx1"/>
+                </a:solidFill>
+                <a:headEnd type="oval"/>
+                <a:tailEnd type="oval"/>
+              </a:ln>
+            </p:spPr>
+            <p:style>
+              <a:lnRef idx="2">
+                <a:schemeClr val="accent1"/>
+              </a:lnRef>
+              <a:fillRef idx="0">
+                <a:schemeClr val="accent1"/>
+              </a:fillRef>
+              <a:effectRef idx="1">
+                <a:schemeClr val="accent1"/>
+              </a:effectRef>
+              <a:fontRef idx="minor">
+                <a:schemeClr val="tx1"/>
+              </a:fontRef>
+            </p:style>
+          </p:cxnSp>
+          <p:cxnSp>
+            <p:nvCxnSpPr>
+              <p:cNvPr id="37" name="Straight Connector 36"/>
+              <p:cNvCxnSpPr/>
+              <p:nvPr/>
+            </p:nvCxnSpPr>
+            <p:spPr>
+              <a:xfrm flipV="1">
+                <a:off x="5042470" y="1676401"/>
+                <a:ext cx="0" cy="914399"/>
+              </a:xfrm>
+              <a:prstGeom prst="line">
+                <a:avLst/>
+              </a:prstGeom>
+              <a:ln>
+                <a:solidFill>
+                  <a:schemeClr val="tx1"/>
+                </a:solidFill>
+                <a:headEnd type="oval"/>
+                <a:tailEnd type="oval"/>
+              </a:ln>
+            </p:spPr>
+            <p:style>
+              <a:lnRef idx="2">
+                <a:schemeClr val="accent1"/>
+              </a:lnRef>
+              <a:fillRef idx="0">
+                <a:schemeClr val="accent1"/>
+              </a:fillRef>
+              <a:effectRef idx="1">
+                <a:schemeClr val="accent1"/>
+              </a:effectRef>
+              <a:fontRef idx="minor">
+                <a:schemeClr val="tx1"/>
+              </a:fontRef>
+            </p:style>
+          </p:cxnSp>
+          <p:cxnSp>
+            <p:nvCxnSpPr>
+              <p:cNvPr id="38" name="Straight Connector 37"/>
+              <p:cNvCxnSpPr/>
+              <p:nvPr/>
+            </p:nvCxnSpPr>
+            <p:spPr>
+              <a:xfrm flipV="1">
+                <a:off x="5042470" y="2590800"/>
+                <a:ext cx="0" cy="914399"/>
+              </a:xfrm>
+              <a:prstGeom prst="line">
+                <a:avLst/>
+              </a:prstGeom>
+              <a:ln>
+                <a:solidFill>
+                  <a:schemeClr val="tx1"/>
+                </a:solidFill>
+                <a:headEnd type="oval"/>
+                <a:tailEnd type="oval"/>
+              </a:ln>
+            </p:spPr>
+            <p:style>
+              <a:lnRef idx="2">
+                <a:schemeClr val="accent1"/>
+              </a:lnRef>
+              <a:fillRef idx="0">
+                <a:schemeClr val="accent1"/>
+              </a:fillRef>
+              <a:effectRef idx="1">
+                <a:schemeClr val="accent1"/>
+              </a:effectRef>
+              <a:fontRef idx="minor">
+                <a:schemeClr val="tx1"/>
+              </a:fontRef>
+            </p:style>
+          </p:cxnSp>
+          <p:cxnSp>
+            <p:nvCxnSpPr>
+              <p:cNvPr id="39" name="Straight Connector 38"/>
+              <p:cNvCxnSpPr/>
+              <p:nvPr/>
+            </p:nvCxnSpPr>
+            <p:spPr>
+              <a:xfrm flipV="1">
+                <a:off x="5042470" y="3505199"/>
+                <a:ext cx="0" cy="914399"/>
+              </a:xfrm>
+              <a:prstGeom prst="line">
+                <a:avLst/>
+              </a:prstGeom>
+              <a:ln>
+                <a:solidFill>
+                  <a:schemeClr val="tx1"/>
+                </a:solidFill>
+                <a:headEnd type="oval"/>
+                <a:tailEnd type="oval"/>
+              </a:ln>
+            </p:spPr>
+            <p:style>
+              <a:lnRef idx="2">
+                <a:schemeClr val="accent1"/>
+              </a:lnRef>
+              <a:fillRef idx="0">
+                <a:schemeClr val="accent1"/>
+              </a:fillRef>
+              <a:effectRef idx="1">
+                <a:schemeClr val="accent1"/>
+              </a:effectRef>
+              <a:fontRef idx="minor">
+                <a:schemeClr val="tx1"/>
+              </a:fontRef>
+            </p:style>
+          </p:cxnSp>
+          <p:cxnSp>
+            <p:nvCxnSpPr>
+              <p:cNvPr id="40" name="Straight Connector 39"/>
+              <p:cNvCxnSpPr/>
+              <p:nvPr/>
+            </p:nvCxnSpPr>
+            <p:spPr>
+              <a:xfrm flipV="1">
+                <a:off x="5963505" y="1676401"/>
+                <a:ext cx="0" cy="914399"/>
+              </a:xfrm>
+              <a:prstGeom prst="line">
+                <a:avLst/>
+              </a:prstGeom>
+              <a:ln>
+                <a:solidFill>
+                  <a:schemeClr val="tx1"/>
+                </a:solidFill>
+                <a:headEnd type="oval"/>
+                <a:tailEnd type="oval"/>
+              </a:ln>
+            </p:spPr>
+            <p:style>
+              <a:lnRef idx="2">
+                <a:schemeClr val="accent1"/>
+              </a:lnRef>
+              <a:fillRef idx="0">
+                <a:schemeClr val="accent1"/>
+              </a:fillRef>
+              <a:effectRef idx="1">
+                <a:schemeClr val="accent1"/>
+              </a:effectRef>
+              <a:fontRef idx="minor">
+                <a:schemeClr val="tx1"/>
+              </a:fontRef>
+            </p:style>
+          </p:cxnSp>
+          <p:cxnSp>
+            <p:nvCxnSpPr>
+              <p:cNvPr id="41" name="Straight Connector 40"/>
+              <p:cNvCxnSpPr/>
+              <p:nvPr/>
+            </p:nvCxnSpPr>
+            <p:spPr>
+              <a:xfrm flipV="1">
+                <a:off x="5963505" y="2590800"/>
+                <a:ext cx="0" cy="914399"/>
+              </a:xfrm>
+              <a:prstGeom prst="line">
+                <a:avLst/>
+              </a:prstGeom>
+              <a:ln>
+                <a:solidFill>
+                  <a:schemeClr val="tx1"/>
+                </a:solidFill>
+                <a:headEnd type="oval"/>
+                <a:tailEnd type="oval"/>
+              </a:ln>
+            </p:spPr>
+            <p:style>
+              <a:lnRef idx="2">
+                <a:schemeClr val="accent1"/>
+              </a:lnRef>
+              <a:fillRef idx="0">
+                <a:schemeClr val="accent1"/>
+              </a:fillRef>
+              <a:effectRef idx="1">
+                <a:schemeClr val="accent1"/>
+              </a:effectRef>
+              <a:fontRef idx="minor">
+                <a:schemeClr val="tx1"/>
+              </a:fontRef>
+            </p:style>
+          </p:cxnSp>
+          <p:cxnSp>
+            <p:nvCxnSpPr>
+              <p:cNvPr id="42" name="Straight Connector 41"/>
+              <p:cNvCxnSpPr/>
+              <p:nvPr/>
+            </p:nvCxnSpPr>
+            <p:spPr>
+              <a:xfrm flipV="1">
+                <a:off x="5963505" y="3505199"/>
+                <a:ext cx="0" cy="914399"/>
+              </a:xfrm>
+              <a:prstGeom prst="line">
+                <a:avLst/>
+              </a:prstGeom>
+              <a:ln>
+                <a:solidFill>
+                  <a:schemeClr val="tx1"/>
+                </a:solidFill>
+                <a:headEnd type="oval"/>
+                <a:tailEnd type="oval"/>
+              </a:ln>
+            </p:spPr>
+            <p:style>
+              <a:lnRef idx="2">
+                <a:schemeClr val="accent1"/>
+              </a:lnRef>
+              <a:fillRef idx="0">
+                <a:schemeClr val="accent1"/>
+              </a:fillRef>
+              <a:effectRef idx="1">
+                <a:schemeClr val="accent1"/>
+              </a:effectRef>
+              <a:fontRef idx="minor">
+                <a:schemeClr val="tx1"/>
+              </a:fontRef>
+            </p:style>
+          </p:cxnSp>
+        </p:grpSp>
+        <p:sp>
+          <p:nvSpPr>
+            <p:cNvPr id="44" name="TextBox 43"/>
+            <p:cNvSpPr txBox="1"/>
+            <p:nvPr/>
+          </p:nvSpPr>
           <p:spPr>
-            <a:xfrm flipH="1">
-              <a:off x="3200400" y="1676400"/>
-              <a:ext cx="914400" cy="0"/>
+            <a:xfrm>
+              <a:off x="2105253" y="239111"/>
+              <a:ext cx="685800" cy="461665"/>
             </a:xfrm>
-            <a:prstGeom prst="line">
+            <a:prstGeom prst="rect">
               <a:avLst/>
             </a:prstGeom>
-            <a:ln>
-              <a:solidFill>
-                <a:schemeClr val="tx1"/>
-              </a:solidFill>
-              <a:headEnd type="oval"/>
-              <a:tailEnd type="oval"/>
-            </a:ln>
+            <a:noFill/>
           </p:spPr>
-          <p:style>
-            <a:lnRef idx="2">
-              <a:schemeClr val="accent1"/>
-            </a:lnRef>
-            <a:fillRef idx="0">
-              <a:schemeClr val="accent1"/>
-            </a:fillRef>
-            <a:effectRef idx="1">
-              <a:schemeClr val="accent1"/>
-            </a:effectRef>
-            <a:fontRef idx="minor">
-              <a:schemeClr val="tx1"/>
-            </a:fontRef>
-          </p:style>
-        </p:cxnSp>
-        <p:cxnSp>
-          <p:nvCxnSpPr>
-            <p:cNvPr id="17" name="Straight Connector 16"/>
-            <p:cNvCxnSpPr/>
+          <p:txBody>
+            <a:bodyPr wrap="square" rtlCol="0">
+              <a:spAutoFit/>
+            </a:bodyPr>
+            <a:lstStyle/>
+            <a:p>
+              <a:pPr algn="ctr"/>
+              <a:r>
+                <a:rPr lang="en-US" sz="2400" dirty="0" smtClean="0">
+                  <a:latin typeface="Times New Roman"/>
+                  <a:cs typeface="Times New Roman"/>
+                </a:rPr>
+                <a:t>0</a:t>
+              </a:r>
+              <a:endParaRPr lang="en-US" sz="2400" dirty="0">
+                <a:latin typeface="Times New Roman"/>
+                <a:cs typeface="Times New Roman"/>
+              </a:endParaRPr>
+            </a:p>
+          </p:txBody>
+        </p:sp>
+        <p:sp>
+          <p:nvSpPr>
+            <p:cNvPr id="45" name="TextBox 44"/>
+            <p:cNvSpPr txBox="1"/>
             <p:nvPr/>
-          </p:nvCxnSpPr>
+          </p:nvSpPr>
           <p:spPr>
-            <a:xfrm flipH="1">
-              <a:off x="4114800" y="1676400"/>
-              <a:ext cx="914400" cy="0"/>
+            <a:xfrm>
+              <a:off x="4305300" y="228600"/>
+              <a:ext cx="876300" cy="461665"/>
             </a:xfrm>
-            <a:prstGeom prst="line">
+            <a:prstGeom prst="rect">
               <a:avLst/>
             </a:prstGeom>
-            <a:ln>
-              <a:solidFill>
-                <a:schemeClr val="tx1"/>
-              </a:solidFill>
-              <a:headEnd type="oval"/>
-              <a:tailEnd type="oval"/>
-            </a:ln>
+            <a:noFill/>
           </p:spPr>
-          <p:style>
-            <a:lnRef idx="2">
-              <a:schemeClr val="accent1"/>
-            </a:lnRef>
-            <a:fillRef idx="0">
-              <a:schemeClr val="accent1"/>
-            </a:fillRef>
-            <a:effectRef idx="1">
-              <a:schemeClr val="accent1"/>
-            </a:effectRef>
-            <a:fontRef idx="minor">
-              <a:schemeClr val="tx1"/>
-            </a:fontRef>
-          </p:style>
-        </p:cxnSp>
-        <p:cxnSp>
-          <p:nvCxnSpPr>
-            <p:cNvPr id="18" name="Straight Connector 17"/>
-            <p:cNvCxnSpPr/>
+          <p:txBody>
+            <a:bodyPr wrap="square" rtlCol="0">
+              <a:spAutoFit/>
+            </a:bodyPr>
+            <a:lstStyle/>
+            <a:p>
+              <a:pPr algn="ctr"/>
+              <a:r>
+                <a:rPr lang="en-US" sz="2400" dirty="0" smtClean="0">
+                  <a:latin typeface="Times New Roman"/>
+                  <a:cs typeface="Times New Roman"/>
+                </a:rPr>
+                <a:t>0.04</a:t>
+              </a:r>
+              <a:endParaRPr lang="en-US" sz="2400" dirty="0">
+                <a:latin typeface="Times New Roman"/>
+                <a:cs typeface="Times New Roman"/>
+              </a:endParaRPr>
+            </a:p>
+          </p:txBody>
+        </p:sp>
+        <p:sp>
+          <p:nvSpPr>
+            <p:cNvPr id="46" name="TextBox 45"/>
+            <p:cNvSpPr txBox="1"/>
             <p:nvPr/>
-          </p:nvCxnSpPr>
+          </p:nvSpPr>
           <p:spPr>
-            <a:xfrm flipH="1">
-              <a:off x="5029200" y="1676400"/>
-              <a:ext cx="914400" cy="0"/>
+            <a:xfrm>
+              <a:off x="6781800" y="239111"/>
+              <a:ext cx="876300" cy="461665"/>
             </a:xfrm>
-            <a:prstGeom prst="line">
+            <a:prstGeom prst="rect">
               <a:avLst/>
             </a:prstGeom>
-            <a:ln>
-              <a:solidFill>
-                <a:schemeClr val="tx1"/>
-              </a:solidFill>
-              <a:headEnd type="oval"/>
-              <a:tailEnd type="oval"/>
-            </a:ln>
+            <a:noFill/>
           </p:spPr>
-          <p:style>
-            <a:lnRef idx="2">
-              <a:schemeClr val="accent1"/>
-            </a:lnRef>
-            <a:fillRef idx="0">
-              <a:schemeClr val="accent1"/>
-            </a:fillRef>
-            <a:effectRef idx="1">
-              <a:schemeClr val="accent1"/>
-            </a:effectRef>
-            <a:fontRef idx="minor">
-              <a:schemeClr val="tx1"/>
-            </a:fontRef>
-          </p:style>
-        </p:cxnSp>
-        <p:cxnSp>
-          <p:nvCxnSpPr>
-            <p:cNvPr id="19" name="Straight Connector 18"/>
-            <p:cNvCxnSpPr/>
+          <p:txBody>
+            <a:bodyPr wrap="square" rtlCol="0">
+              <a:spAutoFit/>
+            </a:bodyPr>
+            <a:lstStyle/>
+            <a:p>
+              <a:pPr algn="ctr"/>
+              <a:r>
+                <a:rPr lang="en-US" sz="2400" dirty="0" smtClean="0">
+                  <a:latin typeface="Times New Roman"/>
+                  <a:cs typeface="Times New Roman"/>
+                </a:rPr>
+                <a:t>0.08</a:t>
+              </a:r>
+              <a:endParaRPr lang="en-US" sz="2400" dirty="0">
+                <a:latin typeface="Times New Roman"/>
+                <a:cs typeface="Times New Roman"/>
+              </a:endParaRPr>
+            </a:p>
+          </p:txBody>
+        </p:sp>
+        <p:sp>
+          <p:nvSpPr>
+            <p:cNvPr id="47" name="TextBox 46"/>
+            <p:cNvSpPr txBox="1"/>
             <p:nvPr/>
-          </p:nvCxnSpPr>
+          </p:nvSpPr>
           <p:spPr>
-            <a:xfrm flipV="1">
-              <a:off x="3200400" y="1676401"/>
-              <a:ext cx="0" cy="914399"/>
+            <a:xfrm>
+              <a:off x="571500" y="1446346"/>
+              <a:ext cx="1104900" cy="461665"/>
             </a:xfrm>
-            <a:prstGeom prst="line">
+            <a:prstGeom prst="rect">
               <a:avLst/>
             </a:prstGeom>
-            <a:ln>
-              <a:solidFill>
-                <a:schemeClr val="tx1"/>
-              </a:solidFill>
-              <a:headEnd type="oval"/>
-              <a:tailEnd type="oval"/>
-            </a:ln>
+            <a:noFill/>
           </p:spPr>
-          <p:style>
-            <a:lnRef idx="2">
-              <a:schemeClr val="accent1"/>
-            </a:lnRef>
-            <a:fillRef idx="0">
-              <a:schemeClr val="accent1"/>
-            </a:fillRef>
-            <a:effectRef idx="1">
-              <a:schemeClr val="accent1"/>
-            </a:effectRef>
-            <a:fontRef idx="minor">
-              <a:schemeClr val="tx1"/>
-            </a:fontRef>
-          </p:style>
-        </p:cxnSp>
-        <p:cxnSp>
-          <p:nvCxnSpPr>
-            <p:cNvPr id="23" name="Straight Connector 22"/>
-            <p:cNvCxnSpPr/>
+          <p:txBody>
+            <a:bodyPr wrap="square" rtlCol="0">
+              <a:spAutoFit/>
+            </a:bodyPr>
+            <a:lstStyle/>
+            <a:p>
+              <a:pPr algn="ctr"/>
+              <a:r>
+                <a:rPr lang="en-US" sz="2400" dirty="0" smtClean="0">
+                  <a:latin typeface="Times New Roman"/>
+                  <a:cs typeface="Times New Roman"/>
+                </a:rPr>
+                <a:t>1</a:t>
+              </a:r>
+              <a:endParaRPr lang="en-US" sz="2400" dirty="0">
+                <a:latin typeface="Times New Roman"/>
+                <a:cs typeface="Times New Roman"/>
+              </a:endParaRPr>
+            </a:p>
+          </p:txBody>
+        </p:sp>
+        <p:sp>
+          <p:nvSpPr>
+            <p:cNvPr id="48" name="TextBox 47"/>
+            <p:cNvSpPr txBox="1"/>
             <p:nvPr/>
-          </p:nvCxnSpPr>
+          </p:nvSpPr>
           <p:spPr>
-            <a:xfrm flipV="1">
-              <a:off x="3200400" y="2590800"/>
-              <a:ext cx="0" cy="914399"/>
+            <a:xfrm>
+              <a:off x="484444" y="3297916"/>
+              <a:ext cx="1101582" cy="461665"/>
             </a:xfrm>
-            <a:prstGeom prst="line">
+            <a:prstGeom prst="rect">
               <a:avLst/>
             </a:prstGeom>
-            <a:ln>
-              <a:solidFill>
-                <a:schemeClr val="tx1"/>
-              </a:solidFill>
-              <a:headEnd type="oval"/>
-              <a:tailEnd type="oval"/>
-            </a:ln>
+            <a:noFill/>
           </p:spPr>
-          <p:style>
-            <a:lnRef idx="2">
-              <a:schemeClr val="accent1"/>
-            </a:lnRef>
-            <a:fillRef idx="0">
-              <a:schemeClr val="accent1"/>
-            </a:fillRef>
-            <a:effectRef idx="1">
-              <a:schemeClr val="accent1"/>
-            </a:effectRef>
-            <a:fontRef idx="minor">
-              <a:schemeClr val="tx1"/>
-            </a:fontRef>
-          </p:style>
-        </p:cxnSp>
-        <p:cxnSp>
-          <p:nvCxnSpPr>
-            <p:cNvPr id="24" name="Straight Connector 23"/>
-            <p:cNvCxnSpPr/>
+          <p:txBody>
+            <a:bodyPr wrap="square" rtlCol="0">
+              <a:spAutoFit/>
+            </a:bodyPr>
+            <a:lstStyle/>
+            <a:p>
+              <a:pPr algn="ctr"/>
+              <a:r>
+                <a:rPr lang="en-US" sz="2400" dirty="0" smtClean="0">
+                  <a:latin typeface="Times New Roman"/>
+                  <a:cs typeface="Times New Roman"/>
+                </a:rPr>
+                <a:t>1.01</a:t>
+              </a:r>
+              <a:endParaRPr lang="en-US" sz="2400" dirty="0">
+                <a:latin typeface="Times New Roman"/>
+                <a:cs typeface="Times New Roman"/>
+              </a:endParaRPr>
+            </a:p>
+          </p:txBody>
+        </p:sp>
+        <p:sp>
+          <p:nvSpPr>
+            <p:cNvPr id="49" name="TextBox 48"/>
+            <p:cNvSpPr txBox="1"/>
             <p:nvPr/>
-          </p:nvCxnSpPr>
+          </p:nvSpPr>
           <p:spPr>
-            <a:xfrm flipV="1">
-              <a:off x="3200400" y="3505199"/>
-              <a:ext cx="0" cy="914399"/>
+            <a:xfrm>
+              <a:off x="474548" y="5236750"/>
+              <a:ext cx="993918" cy="461665"/>
             </a:xfrm>
-            <a:prstGeom prst="line">
+            <a:prstGeom prst="rect">
               <a:avLst/>
             </a:prstGeom>
-            <a:ln>
-              <a:solidFill>
-                <a:schemeClr val="tx1"/>
-              </a:solidFill>
-              <a:headEnd type="oval"/>
-              <a:tailEnd type="oval"/>
-            </a:ln>
+            <a:noFill/>
           </p:spPr>
-          <p:style>
-            <a:lnRef idx="2">
-              <a:schemeClr val="accent1"/>
-            </a:lnRef>
-            <a:fillRef idx="0">
-              <a:schemeClr val="accent1"/>
-            </a:fillRef>
-            <a:effectRef idx="1">
-              <a:schemeClr val="accent1"/>
-            </a:effectRef>
-            <a:fontRef idx="minor">
-              <a:schemeClr val="tx1"/>
-            </a:fontRef>
-          </p:style>
-        </p:cxnSp>
-        <p:cxnSp>
-          <p:nvCxnSpPr>
-            <p:cNvPr id="25" name="Straight Connector 24"/>
-            <p:cNvCxnSpPr/>
+          <p:txBody>
+            <a:bodyPr wrap="square" rtlCol="0">
+              <a:spAutoFit/>
+            </a:bodyPr>
+            <a:lstStyle/>
+            <a:p>
+              <a:pPr algn="ctr"/>
+              <a:r>
+                <a:rPr lang="en-US" sz="2400" dirty="0" smtClean="0">
+                  <a:latin typeface="Times New Roman"/>
+                  <a:cs typeface="Times New Roman"/>
+                </a:rPr>
+                <a:t>1.02</a:t>
+              </a:r>
+              <a:endParaRPr lang="en-US" sz="2400" dirty="0">
+                <a:latin typeface="Times New Roman"/>
+                <a:cs typeface="Times New Roman"/>
+              </a:endParaRPr>
+            </a:p>
+          </p:txBody>
+        </p:sp>
+        <p:sp>
+          <p:nvSpPr>
+            <p:cNvPr id="50" name="TextBox 49"/>
+            <p:cNvSpPr txBox="1"/>
             <p:nvPr/>
-          </p:nvCxnSpPr>
+          </p:nvSpPr>
           <p:spPr>
-            <a:xfrm flipH="1">
-              <a:off x="3200400" y="2605581"/>
-              <a:ext cx="914400" cy="0"/>
+            <a:xfrm>
+              <a:off x="2743200" y="1450826"/>
+              <a:ext cx="1104900" cy="461665"/>
             </a:xfrm>
-            <a:prstGeom prst="line">
+            <a:prstGeom prst="rect">
               <a:avLst/>
             </a:prstGeom>
-            <a:ln>
-              <a:solidFill>
-                <a:schemeClr val="tx1"/>
-              </a:solidFill>
-              <a:headEnd type="oval"/>
-              <a:tailEnd type="oval"/>
-            </a:ln>
+            <a:noFill/>
           </p:spPr>
-          <p:style>
-            <a:lnRef idx="2">
-              <a:schemeClr val="accent1"/>
-            </a:lnRef>
-            <a:fillRef idx="0">
-              <a:schemeClr val="accent1"/>
-            </a:fillRef>
-            <a:effectRef idx="1">
-              <a:schemeClr val="accent1"/>
-            </a:effectRef>
-            <a:fontRef idx="minor">
-              <a:schemeClr val="tx1"/>
-            </a:fontRef>
-          </p:style>
-        </p:cxnSp>
-        <p:cxnSp>
-          <p:nvCxnSpPr>
-            <p:cNvPr id="26" name="Straight Connector 25"/>
-            <p:cNvCxnSpPr/>
+          <p:txBody>
+            <a:bodyPr wrap="square" rtlCol="0">
+              <a:spAutoFit/>
+            </a:bodyPr>
+            <a:lstStyle/>
+            <a:p>
+              <a:pPr algn="ctr"/>
+              <a:r>
+                <a:rPr lang="en-US" sz="2400" dirty="0" smtClean="0">
+                  <a:latin typeface="Times New Roman"/>
+                  <a:cs typeface="Times New Roman"/>
+                </a:rPr>
+                <a:t>1.04</a:t>
+              </a:r>
+              <a:endParaRPr lang="en-US" sz="2400" dirty="0">
+                <a:latin typeface="Times New Roman"/>
+                <a:cs typeface="Times New Roman"/>
+              </a:endParaRPr>
+            </a:p>
+          </p:txBody>
+        </p:sp>
+        <p:sp>
+          <p:nvSpPr>
+            <p:cNvPr id="51" name="TextBox 50"/>
+            <p:cNvSpPr txBox="1"/>
             <p:nvPr/>
-          </p:nvCxnSpPr>
+          </p:nvSpPr>
           <p:spPr>
-            <a:xfrm flipH="1">
-              <a:off x="4114800" y="2605581"/>
-              <a:ext cx="914400" cy="0"/>
+            <a:xfrm>
+              <a:off x="4953000" y="1450826"/>
+              <a:ext cx="1104900" cy="461665"/>
             </a:xfrm>
-            <a:prstGeom prst="line">
+            <a:prstGeom prst="rect">
               <a:avLst/>
             </a:prstGeom>
-            <a:ln>
-              <a:solidFill>
-                <a:schemeClr val="tx1"/>
-              </a:solidFill>
-              <a:headEnd type="oval"/>
-              <a:tailEnd type="oval"/>
-            </a:ln>
+            <a:noFill/>
           </p:spPr>
-          <p:style>
-            <a:lnRef idx="2">
-              <a:schemeClr val="accent1"/>
-            </a:lnRef>
-            <a:fillRef idx="0">
-              <a:schemeClr val="accent1"/>
-            </a:fillRef>
-            <a:effectRef idx="1">
-              <a:schemeClr val="accent1"/>
-            </a:effectRef>
-            <a:fontRef idx="minor">
-              <a:schemeClr val="tx1"/>
-            </a:fontRef>
-          </p:style>
-        </p:cxnSp>
-        <p:cxnSp>
-          <p:nvCxnSpPr>
-            <p:cNvPr id="27" name="Straight Connector 26"/>
-            <p:cNvCxnSpPr/>
+          <p:txBody>
+            <a:bodyPr wrap="square" rtlCol="0">
+              <a:spAutoFit/>
+            </a:bodyPr>
+            <a:lstStyle/>
+            <a:p>
+              <a:pPr algn="ctr"/>
+              <a:r>
+                <a:rPr lang="en-US" sz="2400" dirty="0" smtClean="0">
+                  <a:latin typeface="Times New Roman"/>
+                  <a:cs typeface="Times New Roman"/>
+                </a:rPr>
+                <a:t>1.08</a:t>
+              </a:r>
+              <a:endParaRPr lang="en-US" sz="2400" dirty="0">
+                <a:latin typeface="Times New Roman"/>
+                <a:cs typeface="Times New Roman"/>
+              </a:endParaRPr>
+            </a:p>
+          </p:txBody>
+        </p:sp>
+        <p:sp>
+          <p:nvSpPr>
+            <p:cNvPr id="52" name="TextBox 51"/>
+            <p:cNvSpPr txBox="1"/>
             <p:nvPr/>
-          </p:nvCxnSpPr>
+          </p:nvSpPr>
           <p:spPr>
-            <a:xfrm flipH="1">
-              <a:off x="5029200" y="2605581"/>
-              <a:ext cx="914400" cy="0"/>
+            <a:xfrm>
+              <a:off x="7239000" y="1418560"/>
+              <a:ext cx="1104900" cy="461665"/>
             </a:xfrm>
-            <a:prstGeom prst="line">
+            <a:prstGeom prst="rect">
               <a:avLst/>
             </a:prstGeom>
-            <a:ln>
-              <a:solidFill>
-                <a:schemeClr val="tx1"/>
-              </a:solidFill>
-              <a:headEnd type="oval"/>
-              <a:tailEnd type="oval"/>
-            </a:ln>
+            <a:noFill/>
           </p:spPr>
-          <p:style>
-            <a:lnRef idx="2">
-              <a:schemeClr val="accent1"/>
-            </a:lnRef>
-            <a:fillRef idx="0">
-              <a:schemeClr val="accent1"/>
-            </a:fillRef>
-            <a:effectRef idx="1">
-              <a:schemeClr val="accent1"/>
-            </a:effectRef>
-            <a:fontRef idx="minor">
-              <a:schemeClr val="tx1"/>
-            </a:fontRef>
-          </p:style>
-        </p:cxnSp>
-        <p:cxnSp>
-          <p:nvCxnSpPr>
-            <p:cNvPr id="28" name="Straight Connector 27"/>
-            <p:cNvCxnSpPr/>
+          <p:txBody>
+            <a:bodyPr wrap="square" rtlCol="0">
+              <a:spAutoFit/>
+            </a:bodyPr>
+            <a:lstStyle/>
+            <a:p>
+              <a:pPr algn="ctr"/>
+              <a:r>
+                <a:rPr lang="en-US" sz="2400" dirty="0" smtClean="0">
+                  <a:latin typeface="Times New Roman"/>
+                  <a:cs typeface="Times New Roman"/>
+                </a:rPr>
+                <a:t>1.12</a:t>
+              </a:r>
+              <a:endParaRPr lang="en-US" sz="2400" dirty="0">
+                <a:latin typeface="Times New Roman"/>
+                <a:cs typeface="Times New Roman"/>
+              </a:endParaRPr>
+            </a:p>
+          </p:txBody>
+        </p:sp>
+        <p:sp>
+          <p:nvSpPr>
+            <p:cNvPr id="53" name="TextBox 52"/>
+            <p:cNvSpPr txBox="1"/>
             <p:nvPr/>
-          </p:nvCxnSpPr>
+          </p:nvSpPr>
           <p:spPr>
-            <a:xfrm flipH="1">
-              <a:off x="3220305" y="3520475"/>
-              <a:ext cx="914400" cy="0"/>
+            <a:xfrm>
+              <a:off x="2743200" y="3297916"/>
+              <a:ext cx="1104900" cy="461665"/>
             </a:xfrm>
-            <a:prstGeom prst="line">
+            <a:prstGeom prst="rect">
               <a:avLst/>
             </a:prstGeom>
-            <a:ln>
-              <a:solidFill>
-                <a:schemeClr val="tx1"/>
-              </a:solidFill>
-              <a:headEnd type="oval"/>
-              <a:tailEnd type="oval"/>
-            </a:ln>
+            <a:noFill/>
           </p:spPr>
-          <p:style>
-            <a:lnRef idx="2">
-              <a:schemeClr val="accent1"/>
-            </a:lnRef>
-            <a:fillRef idx="0">
-              <a:schemeClr val="accent1"/>
-            </a:fillRef>
-            <a:effectRef idx="1">
-              <a:schemeClr val="accent1"/>
-            </a:effectRef>
-            <a:fontRef idx="minor">
-              <a:schemeClr val="tx1"/>
-            </a:fontRef>
-          </p:style>
-        </p:cxnSp>
-        <p:cxnSp>
-          <p:nvCxnSpPr>
-            <p:cNvPr id="29" name="Straight Connector 28"/>
-            <p:cNvCxnSpPr/>
+          <p:txBody>
+            <a:bodyPr wrap="square" rtlCol="0">
+              <a:spAutoFit/>
+            </a:bodyPr>
+            <a:lstStyle/>
+            <a:p>
+              <a:pPr algn="ctr"/>
+              <a:r>
+                <a:rPr lang="en-US" sz="2400" dirty="0" smtClean="0">
+                  <a:latin typeface="Times New Roman"/>
+                  <a:cs typeface="Times New Roman"/>
+                </a:rPr>
+                <a:t>1.05</a:t>
+              </a:r>
+              <a:endParaRPr lang="en-US" sz="2400" dirty="0">
+                <a:latin typeface="Times New Roman"/>
+                <a:cs typeface="Times New Roman"/>
+              </a:endParaRPr>
+            </a:p>
+          </p:txBody>
+        </p:sp>
+        <p:sp>
+          <p:nvSpPr>
+            <p:cNvPr id="54" name="TextBox 53"/>
+            <p:cNvSpPr txBox="1"/>
             <p:nvPr/>
-          </p:nvCxnSpPr>
+          </p:nvSpPr>
           <p:spPr>
-            <a:xfrm flipH="1">
-              <a:off x="4134705" y="3520475"/>
-              <a:ext cx="914400" cy="0"/>
+            <a:xfrm>
+              <a:off x="2743200" y="5253335"/>
+              <a:ext cx="1104900" cy="461665"/>
             </a:xfrm>
-            <a:prstGeom prst="line">
+            <a:prstGeom prst="rect">
               <a:avLst/>
             </a:prstGeom>
-            <a:ln>
-              <a:solidFill>
-                <a:schemeClr val="tx1"/>
-              </a:solidFill>
-              <a:headEnd type="oval"/>
-              <a:tailEnd type="oval"/>
-            </a:ln>
+            <a:noFill/>
           </p:spPr>
-          <p:style>
-            <a:lnRef idx="2">
-              <a:schemeClr val="accent1"/>
-            </a:lnRef>
-            <a:fillRef idx="0">
-              <a:schemeClr val="accent1"/>
-            </a:fillRef>
-            <a:effectRef idx="1">
-              <a:schemeClr val="accent1"/>
-            </a:effectRef>
-            <a:fontRef idx="minor">
-              <a:schemeClr val="tx1"/>
-            </a:fontRef>
-          </p:style>
-        </p:cxnSp>
-        <p:cxnSp>
-          <p:nvCxnSpPr>
-            <p:cNvPr id="30" name="Straight Connector 29"/>
-            <p:cNvCxnSpPr/>
+          <p:txBody>
+            <a:bodyPr wrap="square" rtlCol="0">
+              <a:spAutoFit/>
+            </a:bodyPr>
+            <a:lstStyle/>
+            <a:p>
+              <a:pPr algn="ctr"/>
+              <a:r>
+                <a:rPr lang="en-US" sz="2400" dirty="0" smtClean="0">
+                  <a:latin typeface="Times New Roman"/>
+                  <a:cs typeface="Times New Roman"/>
+                </a:rPr>
+                <a:t>1.06</a:t>
+              </a:r>
+              <a:endParaRPr lang="en-US" sz="2400" dirty="0">
+                <a:latin typeface="Times New Roman"/>
+                <a:cs typeface="Times New Roman"/>
+              </a:endParaRPr>
+            </a:p>
+          </p:txBody>
+        </p:sp>
+        <p:sp>
+          <p:nvSpPr>
+            <p:cNvPr id="55" name="TextBox 54"/>
+            <p:cNvSpPr txBox="1"/>
             <p:nvPr/>
-          </p:nvCxnSpPr>
+          </p:nvSpPr>
           <p:spPr>
-            <a:xfrm flipH="1">
-              <a:off x="5049105" y="3520475"/>
-              <a:ext cx="914400" cy="0"/>
+            <a:xfrm>
+              <a:off x="4953000" y="3297916"/>
+              <a:ext cx="1104900" cy="461665"/>
             </a:xfrm>
-            <a:prstGeom prst="line">
+            <a:prstGeom prst="rect">
               <a:avLst/>
             </a:prstGeom>
-            <a:ln>
-              <a:solidFill>
-                <a:schemeClr val="tx1"/>
-              </a:solidFill>
-              <a:headEnd type="oval"/>
-              <a:tailEnd type="oval"/>
-            </a:ln>
+            <a:noFill/>
           </p:spPr>
-          <p:style>
-            <a:lnRef idx="2">
-              <a:schemeClr val="accent1"/>
-            </a:lnRef>
-            <a:fillRef idx="0">
-              <a:schemeClr val="accent1"/>
-            </a:fillRef>
-            <a:effectRef idx="1">
-              <a:schemeClr val="accent1"/>
-            </a:effectRef>
-            <a:fontRef idx="minor">
-              <a:schemeClr val="tx1"/>
-            </a:fontRef>
-          </p:style>
-        </p:cxnSp>
-        <p:cxnSp>
-          <p:nvCxnSpPr>
-            <p:cNvPr id="31" name="Straight Connector 30"/>
-            <p:cNvCxnSpPr/>
+          <p:txBody>
+            <a:bodyPr wrap="square" rtlCol="0">
+              <a:spAutoFit/>
+            </a:bodyPr>
+            <a:lstStyle/>
+            <a:p>
+              <a:pPr algn="ctr"/>
+              <a:r>
+                <a:rPr lang="en-US" sz="2400" dirty="0" smtClean="0">
+                  <a:latin typeface="Times New Roman"/>
+                  <a:cs typeface="Times New Roman"/>
+                </a:rPr>
+                <a:t>1.09</a:t>
+              </a:r>
+              <a:endParaRPr lang="en-US" sz="2400" dirty="0">
+                <a:latin typeface="Times New Roman"/>
+                <a:cs typeface="Times New Roman"/>
+              </a:endParaRPr>
+            </a:p>
+          </p:txBody>
+        </p:sp>
+        <p:sp>
+          <p:nvSpPr>
+            <p:cNvPr id="56" name="TextBox 55"/>
+            <p:cNvSpPr txBox="1"/>
             <p:nvPr/>
-          </p:nvCxnSpPr>
+          </p:nvSpPr>
           <p:spPr>
-            <a:xfrm flipH="1">
-              <a:off x="3213670" y="4430826"/>
-              <a:ext cx="914400" cy="0"/>
+            <a:xfrm>
+              <a:off x="4953000" y="5253335"/>
+              <a:ext cx="1104900" cy="461665"/>
             </a:xfrm>
-            <a:prstGeom prst="line">
+            <a:prstGeom prst="rect">
               <a:avLst/>
             </a:prstGeom>
-            <a:ln>
-              <a:solidFill>
-                <a:schemeClr val="tx1"/>
-              </a:solidFill>
-              <a:headEnd type="oval"/>
-              <a:tailEnd type="oval"/>
-            </a:ln>
+            <a:noFill/>
           </p:spPr>
-          <p:style>
-            <a:lnRef idx="2">
-              <a:schemeClr val="accent1"/>
-            </a:lnRef>
-            <a:fillRef idx="0">
-              <a:schemeClr val="accent1"/>
-            </a:fillRef>
-            <a:effectRef idx="1">
-              <a:schemeClr val="accent1"/>
-            </a:effectRef>
-            <a:fontRef idx="minor">
-              <a:schemeClr val="tx1"/>
-            </a:fontRef>
-          </p:style>
-        </p:cxnSp>
-        <p:cxnSp>
-          <p:nvCxnSpPr>
-            <p:cNvPr id="32" name="Straight Connector 31"/>
-            <p:cNvCxnSpPr/>
+          <p:txBody>
+            <a:bodyPr wrap="square" rtlCol="0">
+              <a:spAutoFit/>
+            </a:bodyPr>
+            <a:lstStyle/>
+            <a:p>
+              <a:pPr algn="ctr"/>
+              <a:r>
+                <a:rPr lang="en-US" sz="2400" dirty="0" smtClean="0">
+                  <a:latin typeface="Times New Roman"/>
+                  <a:cs typeface="Times New Roman"/>
+                </a:rPr>
+                <a:t>1.10</a:t>
+              </a:r>
+              <a:endParaRPr lang="en-US" sz="2400" dirty="0">
+                <a:latin typeface="Times New Roman"/>
+                <a:cs typeface="Times New Roman"/>
+              </a:endParaRPr>
+            </a:p>
+          </p:txBody>
+        </p:sp>
+        <p:sp>
+          <p:nvSpPr>
+            <p:cNvPr id="57" name="TextBox 56"/>
+            <p:cNvSpPr txBox="1"/>
             <p:nvPr/>
-          </p:nvCxnSpPr>
+          </p:nvSpPr>
           <p:spPr>
-            <a:xfrm flipH="1">
-              <a:off x="4128070" y="4430826"/>
-              <a:ext cx="914400" cy="0"/>
+            <a:xfrm>
+              <a:off x="7239000" y="3297916"/>
+              <a:ext cx="1104900" cy="461665"/>
             </a:xfrm>
-            <a:prstGeom prst="line">
+            <a:prstGeom prst="rect">
               <a:avLst/>
             </a:prstGeom>
-            <a:ln>
-              <a:solidFill>
-                <a:schemeClr val="tx1"/>
-              </a:solidFill>
-              <a:headEnd type="oval"/>
-              <a:tailEnd type="oval"/>
-            </a:ln>
+            <a:noFill/>
           </p:spPr>
-          <p:style>
-            <a:lnRef idx="2">
-              <a:schemeClr val="accent1"/>
-            </a:lnRef>
-            <a:fillRef idx="0">
-              <a:schemeClr val="accent1"/>
-            </a:fillRef>
-            <a:effectRef idx="1">
-              <a:schemeClr val="accent1"/>
-            </a:effectRef>
-            <a:fontRef idx="minor">
-              <a:schemeClr val="tx1"/>
-            </a:fontRef>
-          </p:style>
-        </p:cxnSp>
-        <p:cxnSp>
-          <p:nvCxnSpPr>
-            <p:cNvPr id="33" name="Straight Connector 32"/>
-            <p:cNvCxnSpPr/>
+          <p:txBody>
+            <a:bodyPr wrap="square" rtlCol="0">
+              <a:spAutoFit/>
+            </a:bodyPr>
+            <a:lstStyle/>
+            <a:p>
+              <a:pPr algn="ctr"/>
+              <a:r>
+                <a:rPr lang="en-US" sz="2400" dirty="0" smtClean="0">
+                  <a:latin typeface="Times New Roman"/>
+                  <a:cs typeface="Times New Roman"/>
+                </a:rPr>
+                <a:t>1.13</a:t>
+              </a:r>
+              <a:endParaRPr lang="en-US" sz="2400" dirty="0">
+                <a:latin typeface="Times New Roman"/>
+                <a:cs typeface="Times New Roman"/>
+              </a:endParaRPr>
+            </a:p>
+          </p:txBody>
+        </p:sp>
+        <p:sp>
+          <p:nvSpPr>
+            <p:cNvPr id="58" name="TextBox 57"/>
+            <p:cNvSpPr txBox="1"/>
             <p:nvPr/>
-          </p:nvCxnSpPr>
+          </p:nvSpPr>
           <p:spPr>
-            <a:xfrm flipH="1">
-              <a:off x="5042470" y="4430826"/>
-              <a:ext cx="914400" cy="0"/>
+            <a:xfrm>
+              <a:off x="7315200" y="5253335"/>
+              <a:ext cx="1104900" cy="461665"/>
             </a:xfrm>
-            <a:prstGeom prst="line">
+            <a:prstGeom prst="rect">
               <a:avLst/>
             </a:prstGeom>
-            <a:ln>
-              <a:solidFill>
-                <a:schemeClr val="tx1"/>
-              </a:solidFill>
-              <a:headEnd type="oval"/>
-              <a:tailEnd type="oval"/>
-            </a:ln>
+            <a:noFill/>
           </p:spPr>
-          <p:style>
-            <a:lnRef idx="2">
-              <a:schemeClr val="accent1"/>
-            </a:lnRef>
-            <a:fillRef idx="0">
-              <a:schemeClr val="accent1"/>
-            </a:fillRef>
-            <a:effectRef idx="1">
-              <a:schemeClr val="accent1"/>
-            </a:effectRef>
-            <a:fontRef idx="minor">
-              <a:schemeClr val="tx1"/>
-            </a:fontRef>
-          </p:style>
-        </p:cxnSp>
-        <p:cxnSp>
-          <p:nvCxnSpPr>
-            <p:cNvPr id="34" name="Straight Connector 33"/>
-            <p:cNvCxnSpPr/>
+          <p:txBody>
+            <a:bodyPr wrap="square" rtlCol="0">
+              <a:spAutoFit/>
+            </a:bodyPr>
+            <a:lstStyle/>
+            <a:p>
+              <a:pPr algn="ctr"/>
+              <a:r>
+                <a:rPr lang="en-US" sz="2400" dirty="0" smtClean="0">
+                  <a:latin typeface="Times New Roman"/>
+                  <a:cs typeface="Times New Roman"/>
+                </a:rPr>
+                <a:t>1.14</a:t>
+              </a:r>
+              <a:endParaRPr lang="en-US" sz="2400" dirty="0">
+                <a:latin typeface="Times New Roman"/>
+                <a:cs typeface="Times New Roman"/>
+              </a:endParaRPr>
+            </a:p>
+          </p:txBody>
+        </p:sp>
+        <p:sp>
+          <p:nvSpPr>
+            <p:cNvPr id="59" name="TextBox 58"/>
+            <p:cNvSpPr txBox="1"/>
             <p:nvPr/>
-          </p:nvCxnSpPr>
+          </p:nvSpPr>
           <p:spPr>
-            <a:xfrm flipV="1">
-              <a:off x="4121435" y="1676401"/>
-              <a:ext cx="0" cy="914399"/>
+            <a:xfrm>
+              <a:off x="2029284" y="2152193"/>
+              <a:ext cx="866316" cy="461665"/>
             </a:xfrm>
-            <a:prstGeom prst="line">
+            <a:prstGeom prst="rect">
               <a:avLst/>
             </a:prstGeom>
-            <a:ln>
-              <a:solidFill>
-                <a:schemeClr val="tx1"/>
-              </a:solidFill>
-              <a:headEnd type="oval"/>
-              <a:tailEnd type="oval"/>
-            </a:ln>
+            <a:noFill/>
           </p:spPr>
-          <p:style>
-            <a:lnRef idx="2">
-              <a:schemeClr val="accent1"/>
-            </a:lnRef>
-            <a:fillRef idx="0">
-              <a:schemeClr val="accent1"/>
-            </a:fillRef>
-            <a:effectRef idx="1">
-              <a:schemeClr val="accent1"/>
-            </a:effectRef>
-            <a:fontRef idx="minor">
-              <a:schemeClr val="tx1"/>
-            </a:fontRef>
-          </p:style>
-        </p:cxnSp>
-        <p:cxnSp>
-          <p:nvCxnSpPr>
-            <p:cNvPr id="35" name="Straight Connector 34"/>
-            <p:cNvCxnSpPr/>
+          <p:txBody>
+            <a:bodyPr wrap="square" rtlCol="0">
+              <a:spAutoFit/>
+            </a:bodyPr>
+            <a:lstStyle/>
+            <a:p>
+              <a:pPr algn="ctr"/>
+              <a:r>
+                <a:rPr lang="en-US" sz="2400" dirty="0" smtClean="0">
+                  <a:latin typeface="Times New Roman"/>
+                  <a:cs typeface="Times New Roman"/>
+                </a:rPr>
+                <a:t>0.01</a:t>
+              </a:r>
+              <a:endParaRPr lang="en-US" sz="2400" dirty="0">
+                <a:latin typeface="Times New Roman"/>
+                <a:cs typeface="Times New Roman"/>
+              </a:endParaRPr>
+            </a:p>
+          </p:txBody>
+        </p:sp>
+        <p:sp>
+          <p:nvSpPr>
+            <p:cNvPr id="60" name="TextBox 59"/>
+            <p:cNvSpPr txBox="1"/>
             <p:nvPr/>
-          </p:nvCxnSpPr>
+          </p:nvSpPr>
           <p:spPr>
-            <a:xfrm flipV="1">
-              <a:off x="4121435" y="2590800"/>
-              <a:ext cx="0" cy="914399"/>
+            <a:xfrm>
+              <a:off x="4227756" y="2152193"/>
+              <a:ext cx="876300" cy="461665"/>
             </a:xfrm>
-            <a:prstGeom prst="line">
+            <a:prstGeom prst="rect">
               <a:avLst/>
             </a:prstGeom>
-            <a:ln>
-              <a:solidFill>
-                <a:schemeClr val="tx1"/>
-              </a:solidFill>
-              <a:headEnd type="oval"/>
-              <a:tailEnd type="oval"/>
-            </a:ln>
+            <a:noFill/>
           </p:spPr>
-          <p:style>
-            <a:lnRef idx="2">
-              <a:schemeClr val="accent1"/>
-            </a:lnRef>
-            <a:fillRef idx="0">
-              <a:schemeClr val="accent1"/>
-            </a:fillRef>
-            <a:effectRef idx="1">
-              <a:schemeClr val="accent1"/>
-            </a:effectRef>
-            <a:fontRef idx="minor">
-              <a:schemeClr val="tx1"/>
-            </a:fontRef>
-          </p:style>
-        </p:cxnSp>
-        <p:cxnSp>
-          <p:nvCxnSpPr>
-            <p:cNvPr id="36" name="Straight Connector 35"/>
-            <p:cNvCxnSpPr/>
+          <p:txBody>
+            <a:bodyPr wrap="square" rtlCol="0">
+              <a:spAutoFit/>
+            </a:bodyPr>
+            <a:lstStyle/>
+            <a:p>
+              <a:pPr algn="ctr"/>
+              <a:r>
+                <a:rPr lang="en-US" sz="2400" dirty="0" smtClean="0">
+                  <a:latin typeface="Times New Roman"/>
+                  <a:cs typeface="Times New Roman"/>
+                </a:rPr>
+                <a:t>0.05</a:t>
+              </a:r>
+              <a:endParaRPr lang="en-US" sz="2400" dirty="0">
+                <a:latin typeface="Times New Roman"/>
+                <a:cs typeface="Times New Roman"/>
+              </a:endParaRPr>
+            </a:p>
+          </p:txBody>
+        </p:sp>
+        <p:sp>
+          <p:nvSpPr>
+            <p:cNvPr id="61" name="TextBox 60"/>
+            <p:cNvSpPr txBox="1"/>
             <p:nvPr/>
-          </p:nvCxnSpPr>
+          </p:nvSpPr>
           <p:spPr>
-            <a:xfrm flipV="1">
-              <a:off x="4121435" y="3505199"/>
-              <a:ext cx="0" cy="914399"/>
+            <a:xfrm>
+              <a:off x="6781800" y="2152193"/>
+              <a:ext cx="876300" cy="461665"/>
             </a:xfrm>
-            <a:prstGeom prst="line">
+            <a:prstGeom prst="rect">
               <a:avLst/>
             </a:prstGeom>
-            <a:ln>
-              <a:solidFill>
-                <a:schemeClr val="tx1"/>
-              </a:solidFill>
-              <a:headEnd type="oval"/>
-              <a:tailEnd type="oval"/>
-            </a:ln>
+            <a:noFill/>
           </p:spPr>
-          <p:style>
-            <a:lnRef idx="2">
-              <a:schemeClr val="accent1"/>
-            </a:lnRef>
-            <a:fillRef idx="0">
-              <a:schemeClr val="accent1"/>
-            </a:fillRef>
-            <a:effectRef idx="1">
-              <a:schemeClr val="accent1"/>
-            </a:effectRef>
-            <a:fontRef idx="minor">
-              <a:schemeClr val="tx1"/>
-            </a:fontRef>
-          </p:style>
-        </p:cxnSp>
-        <p:cxnSp>
-          <p:nvCxnSpPr>
-            <p:cNvPr id="37" name="Straight Connector 36"/>
-            <p:cNvCxnSpPr/>
+          <p:txBody>
+            <a:bodyPr wrap="square" rtlCol="0">
+              <a:spAutoFit/>
+            </a:bodyPr>
+            <a:lstStyle/>
+            <a:p>
+              <a:pPr algn="ctr"/>
+              <a:r>
+                <a:rPr lang="en-US" sz="2400" dirty="0" smtClean="0">
+                  <a:latin typeface="Times New Roman"/>
+                  <a:cs typeface="Times New Roman"/>
+                </a:rPr>
+                <a:t>0.09</a:t>
+              </a:r>
+              <a:endParaRPr lang="en-US" sz="2400" dirty="0">
+                <a:latin typeface="Times New Roman"/>
+                <a:cs typeface="Times New Roman"/>
+              </a:endParaRPr>
+            </a:p>
+          </p:txBody>
+        </p:sp>
+        <p:sp>
+          <p:nvSpPr>
+            <p:cNvPr id="62" name="TextBox 61"/>
+            <p:cNvSpPr txBox="1"/>
             <p:nvPr/>
-          </p:nvCxnSpPr>
+          </p:nvSpPr>
           <p:spPr>
-            <a:xfrm flipV="1">
-              <a:off x="5042470" y="1676401"/>
-              <a:ext cx="0" cy="914399"/>
+            <a:xfrm>
+              <a:off x="2029284" y="4095842"/>
+              <a:ext cx="761769" cy="461665"/>
             </a:xfrm>
-            <a:prstGeom prst="line">
+            <a:prstGeom prst="rect">
               <a:avLst/>
             </a:prstGeom>
-            <a:ln>
-              <a:solidFill>
-                <a:schemeClr val="tx1"/>
-              </a:solidFill>
-              <a:headEnd type="oval"/>
-              <a:tailEnd type="oval"/>
-            </a:ln>
+            <a:noFill/>
           </p:spPr>
-          <p:style>
-            <a:lnRef idx="2">
-              <a:schemeClr val="accent1"/>
-            </a:lnRef>
-            <a:fillRef idx="0">
-              <a:schemeClr val="accent1"/>
-            </a:fillRef>
-            <a:effectRef idx="1">
-              <a:schemeClr val="accent1"/>
-            </a:effectRef>
-            <a:fontRef idx="minor">
-              <a:schemeClr val="tx1"/>
-            </a:fontRef>
-          </p:style>
-        </p:cxnSp>
-        <p:cxnSp>
-          <p:nvCxnSpPr>
-            <p:cNvPr id="38" name="Straight Connector 37"/>
-            <p:cNvCxnSpPr/>
+          <p:txBody>
+            <a:bodyPr wrap="square" rtlCol="0">
+              <a:spAutoFit/>
+            </a:bodyPr>
+            <a:lstStyle/>
+            <a:p>
+              <a:pPr algn="ctr"/>
+              <a:r>
+                <a:rPr lang="en-US" sz="2400" dirty="0" smtClean="0">
+                  <a:latin typeface="Times New Roman"/>
+                  <a:cs typeface="Times New Roman"/>
+                </a:rPr>
+                <a:t>0.02</a:t>
+              </a:r>
+              <a:endParaRPr lang="en-US" sz="2400" dirty="0">
+                <a:latin typeface="Times New Roman"/>
+                <a:cs typeface="Times New Roman"/>
+              </a:endParaRPr>
+            </a:p>
+          </p:txBody>
+        </p:sp>
+        <p:sp>
+          <p:nvSpPr>
+            <p:cNvPr id="63" name="TextBox 62"/>
+            <p:cNvSpPr txBox="1"/>
             <p:nvPr/>
-          </p:nvCxnSpPr>
+          </p:nvSpPr>
           <p:spPr>
-            <a:xfrm flipV="1">
-              <a:off x="5042470" y="2590800"/>
-              <a:ext cx="0" cy="914399"/>
+            <a:xfrm>
+              <a:off x="4227756" y="4110335"/>
+              <a:ext cx="876300" cy="461665"/>
             </a:xfrm>
-            <a:prstGeom prst="line">
+            <a:prstGeom prst="rect">
               <a:avLst/>
             </a:prstGeom>
-            <a:ln>
-              <a:solidFill>
-                <a:schemeClr val="tx1"/>
-              </a:solidFill>
-              <a:headEnd type="oval"/>
-              <a:tailEnd type="oval"/>
-            </a:ln>
+            <a:noFill/>
           </p:spPr>
-          <p:style>
-            <a:lnRef idx="2">
-              <a:schemeClr val="accent1"/>
-            </a:lnRef>
-            <a:fillRef idx="0">
-              <a:schemeClr val="accent1"/>
-            </a:fillRef>
-            <a:effectRef idx="1">
-              <a:schemeClr val="accent1"/>
-            </a:effectRef>
-            <a:fontRef idx="minor">
-              <a:schemeClr val="tx1"/>
-            </a:fontRef>
-          </p:style>
-        </p:cxnSp>
-        <p:cxnSp>
-          <p:nvCxnSpPr>
-            <p:cNvPr id="39" name="Straight Connector 38"/>
-            <p:cNvCxnSpPr/>
+          <p:txBody>
+            <a:bodyPr wrap="square" rtlCol="0">
+              <a:spAutoFit/>
+            </a:bodyPr>
+            <a:lstStyle/>
+            <a:p>
+              <a:pPr algn="ctr"/>
+              <a:r>
+                <a:rPr lang="en-US" sz="2400" dirty="0" smtClean="0">
+                  <a:latin typeface="Times New Roman"/>
+                  <a:cs typeface="Times New Roman"/>
+                </a:rPr>
+                <a:t>0.06</a:t>
+              </a:r>
+              <a:endParaRPr lang="en-US" sz="2400" dirty="0">
+                <a:latin typeface="Times New Roman"/>
+                <a:cs typeface="Times New Roman"/>
+              </a:endParaRPr>
+            </a:p>
+          </p:txBody>
+        </p:sp>
+        <p:sp>
+          <p:nvSpPr>
+            <p:cNvPr id="64" name="TextBox 63"/>
+            <p:cNvSpPr txBox="1"/>
             <p:nvPr/>
-          </p:nvCxnSpPr>
+          </p:nvSpPr>
           <p:spPr>
-            <a:xfrm flipV="1">
-              <a:off x="5042470" y="3505199"/>
-              <a:ext cx="0" cy="914399"/>
+            <a:xfrm>
+              <a:off x="6781800" y="4110335"/>
+              <a:ext cx="876300" cy="461665"/>
             </a:xfrm>
-            <a:prstGeom prst="line">
+            <a:prstGeom prst="rect">
               <a:avLst/>
             </a:prstGeom>
-            <a:ln>
-              <a:solidFill>
-                <a:schemeClr val="tx1"/>
-              </a:solidFill>
-              <a:headEnd type="oval"/>
-              <a:tailEnd type="oval"/>
-            </a:ln>
+            <a:noFill/>
           </p:spPr>
-          <p:style>
-            <a:lnRef idx="2">
-              <a:schemeClr val="accent1"/>
-            </a:lnRef>
-            <a:fillRef idx="0">
-              <a:schemeClr val="accent1"/>
-            </a:fillRef>
-            <a:effectRef idx="1">
-              <a:schemeClr val="accent1"/>
-            </a:effectRef>
-            <a:fontRef idx="minor">
-              <a:schemeClr val="tx1"/>
-            </a:fontRef>
-          </p:style>
-        </p:cxnSp>
-        <p:cxnSp>
-          <p:nvCxnSpPr>
-            <p:cNvPr id="40" name="Straight Connector 39"/>
-            <p:cNvCxnSpPr/>
+          <p:txBody>
+            <a:bodyPr wrap="square" rtlCol="0">
+              <a:spAutoFit/>
+            </a:bodyPr>
+            <a:lstStyle/>
+            <a:p>
+              <a:pPr algn="ctr"/>
+              <a:r>
+                <a:rPr lang="en-US" sz="2400" dirty="0" smtClean="0">
+                  <a:latin typeface="Times New Roman"/>
+                  <a:cs typeface="Times New Roman"/>
+                </a:rPr>
+                <a:t>0.10</a:t>
+              </a:r>
+              <a:endParaRPr lang="en-US" sz="2400" dirty="0">
+                <a:latin typeface="Times New Roman"/>
+                <a:cs typeface="Times New Roman"/>
+              </a:endParaRPr>
+            </a:p>
+          </p:txBody>
+        </p:sp>
+        <p:sp>
+          <p:nvSpPr>
+            <p:cNvPr id="65" name="TextBox 64"/>
+            <p:cNvSpPr txBox="1"/>
             <p:nvPr/>
-          </p:nvCxnSpPr>
+          </p:nvSpPr>
           <p:spPr>
-            <a:xfrm flipV="1">
-              <a:off x="5963505" y="1676401"/>
-              <a:ext cx="0" cy="914399"/>
+            <a:xfrm>
+              <a:off x="2093515" y="5939135"/>
+              <a:ext cx="761769" cy="461665"/>
             </a:xfrm>
-            <a:prstGeom prst="line">
+            <a:prstGeom prst="rect">
               <a:avLst/>
             </a:prstGeom>
-            <a:ln>
-              <a:solidFill>
-                <a:schemeClr val="tx1"/>
-              </a:solidFill>
-              <a:headEnd type="oval"/>
-              <a:tailEnd type="oval"/>
-            </a:ln>
+            <a:noFill/>
           </p:spPr>
-          <p:style>
-            <a:lnRef idx="2">
-              <a:schemeClr val="accent1"/>
-            </a:lnRef>
-            <a:fillRef idx="0">
-              <a:schemeClr val="accent1"/>
-            </a:fillRef>
-            <a:effectRef idx="1">
-              <a:schemeClr val="accent1"/>
-            </a:effectRef>
-            <a:fontRef idx="minor">
-              <a:schemeClr val="tx1"/>
-            </a:fontRef>
-          </p:style>
-        </p:cxnSp>
-        <p:cxnSp>
-          <p:nvCxnSpPr>
-            <p:cNvPr id="41" name="Straight Connector 40"/>
-            <p:cNvCxnSpPr/>
+          <p:txBody>
+            <a:bodyPr wrap="square" rtlCol="0">
+              <a:spAutoFit/>
+            </a:bodyPr>
+            <a:lstStyle/>
+            <a:p>
+              <a:pPr algn="ctr"/>
+              <a:r>
+                <a:rPr lang="en-US" sz="2400" dirty="0" smtClean="0">
+                  <a:latin typeface="Times New Roman"/>
+                  <a:cs typeface="Times New Roman"/>
+                </a:rPr>
+                <a:t>0.03</a:t>
+              </a:r>
+              <a:endParaRPr lang="en-US" sz="2400" dirty="0">
+                <a:latin typeface="Times New Roman"/>
+                <a:cs typeface="Times New Roman"/>
+              </a:endParaRPr>
+            </a:p>
+          </p:txBody>
+        </p:sp>
+        <p:sp>
+          <p:nvSpPr>
+            <p:cNvPr id="66" name="TextBox 65"/>
+            <p:cNvSpPr txBox="1"/>
             <p:nvPr/>
-          </p:nvCxnSpPr>
+          </p:nvSpPr>
           <p:spPr>
-            <a:xfrm flipV="1">
-              <a:off x="5963505" y="2590800"/>
-              <a:ext cx="0" cy="914399"/>
+            <a:xfrm>
+              <a:off x="4227756" y="5939135"/>
+              <a:ext cx="876300" cy="461665"/>
             </a:xfrm>
-            <a:prstGeom prst="line">
+            <a:prstGeom prst="rect">
               <a:avLst/>
             </a:prstGeom>
-            <a:ln>
-              <a:solidFill>
-                <a:schemeClr val="tx1"/>
-              </a:solidFill>
-              <a:headEnd type="oval"/>
-              <a:tailEnd type="oval"/>
-            </a:ln>
+            <a:noFill/>
           </p:spPr>
-          <p:style>
-            <a:lnRef idx="2">
-              <a:schemeClr val="accent1"/>
-            </a:lnRef>
-            <a:fillRef idx="0">
-              <a:schemeClr val="accent1"/>
-            </a:fillRef>
-            <a:effectRef idx="1">
-              <a:schemeClr val="accent1"/>
-            </a:effectRef>
-            <a:fontRef idx="minor">
-              <a:schemeClr val="tx1"/>
-            </a:fontRef>
-          </p:style>
-        </p:cxnSp>
-        <p:cxnSp>
-          <p:nvCxnSpPr>
-            <p:cNvPr id="42" name="Straight Connector 41"/>
-            <p:cNvCxnSpPr/>
+          <p:txBody>
+            <a:bodyPr wrap="square" rtlCol="0">
+              <a:spAutoFit/>
+            </a:bodyPr>
+            <a:lstStyle/>
+            <a:p>
+              <a:pPr algn="ctr"/>
+              <a:r>
+                <a:rPr lang="en-US" sz="2400" dirty="0" smtClean="0">
+                  <a:latin typeface="Times New Roman"/>
+                  <a:cs typeface="Times New Roman"/>
+                </a:rPr>
+                <a:t>0.07</a:t>
+              </a:r>
+              <a:endParaRPr lang="en-US" sz="2400" dirty="0">
+                <a:latin typeface="Times New Roman"/>
+                <a:cs typeface="Times New Roman"/>
+              </a:endParaRPr>
+            </a:p>
+          </p:txBody>
+        </p:sp>
+        <p:sp>
+          <p:nvSpPr>
+            <p:cNvPr id="67" name="TextBox 66"/>
+            <p:cNvSpPr txBox="1"/>
             <p:nvPr/>
-          </p:nvCxnSpPr>
+          </p:nvSpPr>
           <p:spPr>
-            <a:xfrm flipV="1">
-              <a:off x="5963505" y="3505199"/>
-              <a:ext cx="0" cy="914399"/>
+            <a:xfrm>
+              <a:off x="6781800" y="5939135"/>
+              <a:ext cx="876300" cy="461665"/>
             </a:xfrm>
-            <a:prstGeom prst="line">
+            <a:prstGeom prst="rect">
               <a:avLst/>
             </a:prstGeom>
-            <a:ln>
-              <a:solidFill>
-                <a:schemeClr val="tx1"/>
-              </a:solidFill>
-              <a:headEnd type="oval"/>
-              <a:tailEnd type="oval"/>
-            </a:ln>
+            <a:noFill/>
           </p:spPr>
-          <p:style>
-            <a:lnRef idx="2">
-              <a:schemeClr val="accent1"/>
-            </a:lnRef>
-            <a:fillRef idx="0">
-              <a:schemeClr val="accent1"/>
-            </a:fillRef>
-            <a:effectRef idx="1">
-              <a:schemeClr val="accent1"/>
-            </a:effectRef>
-            <a:fontRef idx="minor">
-              <a:schemeClr val="tx1"/>
-            </a:fontRef>
-          </p:style>
-        </p:cxnSp>
-      </p:grpSp>
-      <p:sp>
-        <p:nvSpPr>
-          <p:cNvPr id="44" name="TextBox 43"/>
-          <p:cNvSpPr txBox="1"/>
-          <p:nvPr/>
-        </p:nvSpPr>
-        <p:spPr>
-          <a:xfrm>
-            <a:off x="1856916" y="326979"/>
-            <a:ext cx="685800" cy="369332"/>
-          </a:xfrm>
-          <a:prstGeom prst="rect">
-            <a:avLst/>
-          </a:prstGeom>
-          <a:noFill/>
-        </p:spPr>
-        <p:txBody>
-          <a:bodyPr wrap="square" rtlCol="0">
-            <a:spAutoFit/>
-          </a:bodyPr>
-          <a:lstStyle/>
-          <a:p>
-            <a:pPr algn="ctr"/>
-            <a:r>
-              <a:rPr lang="en-US" dirty="0" smtClean="0">
+          <p:txBody>
+            <a:bodyPr wrap="square" rtlCol="0">
+              <a:spAutoFit/>
+            </a:bodyPr>
+            <a:lstStyle/>
+            <a:p>
+              <a:pPr algn="ctr"/>
+              <a:r>
+                <a:rPr lang="en-US" sz="2400" dirty="0" smtClean="0">
+                  <a:latin typeface="Times New Roman"/>
+                  <a:cs typeface="Times New Roman"/>
+                </a:rPr>
+                <a:t>0.11</a:t>
+              </a:r>
+              <a:endParaRPr lang="en-US" sz="2400" dirty="0">
                 <a:latin typeface="Times New Roman"/>
                 <a:cs typeface="Times New Roman"/>
-              </a:rPr>
-              <a:t>0</a:t>
-            </a:r>
-            <a:endParaRPr lang="en-US" dirty="0">
-              <a:latin typeface="Times New Roman"/>
-              <a:cs typeface="Times New Roman"/>
-            </a:endParaRPr>
-          </a:p>
-        </p:txBody>
-      </p:sp>
-      <p:sp>
-        <p:nvSpPr>
-          <p:cNvPr id="45" name="TextBox 44"/>
-          <p:cNvSpPr txBox="1"/>
-          <p:nvPr/>
-        </p:nvSpPr>
-        <p:spPr>
-          <a:xfrm>
-            <a:off x="4196042" y="316468"/>
-            <a:ext cx="876300" cy="369332"/>
-          </a:xfrm>
-          <a:prstGeom prst="rect">
-            <a:avLst/>
-          </a:prstGeom>
-          <a:noFill/>
-        </p:spPr>
-        <p:txBody>
-          <a:bodyPr wrap="square" rtlCol="0">
-            <a:spAutoFit/>
-          </a:bodyPr>
-          <a:lstStyle/>
-          <a:p>
-            <a:pPr algn="ctr"/>
-            <a:r>
-              <a:rPr lang="en-US" dirty="0" smtClean="0">
-                <a:latin typeface="Times New Roman"/>
-                <a:cs typeface="Times New Roman"/>
-              </a:rPr>
-              <a:t>0.04</a:t>
-            </a:r>
-            <a:endParaRPr lang="en-US" dirty="0">
-              <a:latin typeface="Times New Roman"/>
-              <a:cs typeface="Times New Roman"/>
-            </a:endParaRPr>
-          </a:p>
-        </p:txBody>
-      </p:sp>
-      <p:sp>
-        <p:nvSpPr>
-          <p:cNvPr id="46" name="TextBox 45"/>
-          <p:cNvSpPr txBox="1"/>
-          <p:nvPr/>
-        </p:nvSpPr>
-        <p:spPr>
-          <a:xfrm>
-            <a:off x="6781800" y="326979"/>
-            <a:ext cx="876300" cy="369332"/>
-          </a:xfrm>
-          <a:prstGeom prst="rect">
-            <a:avLst/>
-          </a:prstGeom>
-          <a:noFill/>
-        </p:spPr>
-        <p:txBody>
-          <a:bodyPr wrap="square" rtlCol="0">
-            <a:spAutoFit/>
-          </a:bodyPr>
-          <a:lstStyle/>
-          <a:p>
-            <a:pPr algn="ctr"/>
-            <a:r>
-              <a:rPr lang="en-US" dirty="0" smtClean="0">
-                <a:latin typeface="Times New Roman"/>
-                <a:cs typeface="Times New Roman"/>
-              </a:rPr>
-              <a:t>0.08</a:t>
-            </a:r>
-            <a:endParaRPr lang="en-US" dirty="0">
-              <a:latin typeface="Times New Roman"/>
-              <a:cs typeface="Times New Roman"/>
-            </a:endParaRPr>
-          </a:p>
-        </p:txBody>
-      </p:sp>
-      <p:sp>
-        <p:nvSpPr>
-          <p:cNvPr id="47" name="TextBox 46"/>
-          <p:cNvSpPr txBox="1"/>
-          <p:nvPr/>
-        </p:nvSpPr>
-        <p:spPr>
-          <a:xfrm>
-            <a:off x="96952" y="1392764"/>
-            <a:ext cx="1104900" cy="369332"/>
-          </a:xfrm>
-          <a:prstGeom prst="rect">
-            <a:avLst/>
-          </a:prstGeom>
-          <a:noFill/>
-        </p:spPr>
-        <p:txBody>
-          <a:bodyPr wrap="square" rtlCol="0">
-            <a:spAutoFit/>
-          </a:bodyPr>
-          <a:lstStyle/>
-          <a:p>
-            <a:pPr algn="ctr"/>
-            <a:r>
-              <a:rPr lang="en-US" dirty="0" smtClean="0">
-                <a:latin typeface="Times New Roman"/>
-                <a:cs typeface="Times New Roman"/>
-              </a:rPr>
-              <a:t>1</a:t>
-            </a:r>
-            <a:endParaRPr lang="en-US" dirty="0">
-              <a:latin typeface="Times New Roman"/>
-              <a:cs typeface="Times New Roman"/>
-            </a:endParaRPr>
-          </a:p>
-        </p:txBody>
-      </p:sp>
-      <p:sp>
-        <p:nvSpPr>
-          <p:cNvPr id="48" name="TextBox 47"/>
-          <p:cNvSpPr txBox="1"/>
-          <p:nvPr/>
-        </p:nvSpPr>
-        <p:spPr>
-          <a:xfrm>
-            <a:off x="86096" y="3244334"/>
-            <a:ext cx="1101582" cy="369332"/>
-          </a:xfrm>
-          <a:prstGeom prst="rect">
-            <a:avLst/>
-          </a:prstGeom>
-          <a:noFill/>
-        </p:spPr>
-        <p:txBody>
-          <a:bodyPr wrap="square" rtlCol="0">
-            <a:spAutoFit/>
-          </a:bodyPr>
-          <a:lstStyle/>
-          <a:p>
-            <a:pPr algn="ctr"/>
-            <a:r>
-              <a:rPr lang="en-US" dirty="0" smtClean="0">
-                <a:latin typeface="Times New Roman"/>
-                <a:cs typeface="Times New Roman"/>
-              </a:rPr>
-              <a:t>1.01</a:t>
-            </a:r>
-            <a:endParaRPr lang="en-US" dirty="0">
-              <a:latin typeface="Times New Roman"/>
-              <a:cs typeface="Times New Roman"/>
-            </a:endParaRPr>
-          </a:p>
-        </p:txBody>
-      </p:sp>
-      <p:sp>
-        <p:nvSpPr>
-          <p:cNvPr id="49" name="TextBox 48"/>
-          <p:cNvSpPr txBox="1"/>
-          <p:nvPr/>
-        </p:nvSpPr>
-        <p:spPr>
-          <a:xfrm>
-            <a:off x="135052" y="5183168"/>
-            <a:ext cx="993918" cy="369332"/>
-          </a:xfrm>
-          <a:prstGeom prst="rect">
-            <a:avLst/>
-          </a:prstGeom>
-          <a:noFill/>
-        </p:spPr>
-        <p:txBody>
-          <a:bodyPr wrap="square" rtlCol="0">
-            <a:spAutoFit/>
-          </a:bodyPr>
-          <a:lstStyle/>
-          <a:p>
-            <a:pPr algn="ctr"/>
-            <a:r>
-              <a:rPr lang="en-US" dirty="0" smtClean="0">
-                <a:latin typeface="Times New Roman"/>
-                <a:cs typeface="Times New Roman"/>
-              </a:rPr>
-              <a:t>1.02</a:t>
-            </a:r>
-            <a:endParaRPr lang="en-US" dirty="0">
-              <a:latin typeface="Times New Roman"/>
-              <a:cs typeface="Times New Roman"/>
-            </a:endParaRPr>
-          </a:p>
-        </p:txBody>
-      </p:sp>
-      <p:sp>
-        <p:nvSpPr>
-          <p:cNvPr id="50" name="TextBox 49"/>
-          <p:cNvSpPr txBox="1"/>
-          <p:nvPr/>
-        </p:nvSpPr>
-        <p:spPr>
-          <a:xfrm>
-            <a:off x="2587240" y="1397244"/>
-            <a:ext cx="1104900" cy="369332"/>
-          </a:xfrm>
-          <a:prstGeom prst="rect">
-            <a:avLst/>
-          </a:prstGeom>
-          <a:noFill/>
-        </p:spPr>
-        <p:txBody>
-          <a:bodyPr wrap="square" rtlCol="0">
-            <a:spAutoFit/>
-          </a:bodyPr>
-          <a:lstStyle/>
-          <a:p>
-            <a:pPr algn="ctr"/>
-            <a:r>
-              <a:rPr lang="en-US" dirty="0" smtClean="0">
-                <a:latin typeface="Times New Roman"/>
-                <a:cs typeface="Times New Roman"/>
-              </a:rPr>
-              <a:t>1.04</a:t>
-            </a:r>
-            <a:endParaRPr lang="en-US" dirty="0">
-              <a:latin typeface="Times New Roman"/>
-              <a:cs typeface="Times New Roman"/>
-            </a:endParaRPr>
-          </a:p>
-        </p:txBody>
-      </p:sp>
-      <p:sp>
-        <p:nvSpPr>
-          <p:cNvPr id="51" name="TextBox 50"/>
-          <p:cNvSpPr txBox="1"/>
-          <p:nvPr/>
-        </p:nvSpPr>
-        <p:spPr>
-          <a:xfrm>
-            <a:off x="5057682" y="1397244"/>
-            <a:ext cx="1104900" cy="369332"/>
-          </a:xfrm>
-          <a:prstGeom prst="rect">
-            <a:avLst/>
-          </a:prstGeom>
-          <a:noFill/>
-        </p:spPr>
-        <p:txBody>
-          <a:bodyPr wrap="square" rtlCol="0">
-            <a:spAutoFit/>
-          </a:bodyPr>
-          <a:lstStyle/>
-          <a:p>
-            <a:pPr algn="ctr"/>
-            <a:r>
-              <a:rPr lang="en-US" dirty="0" smtClean="0">
-                <a:latin typeface="Times New Roman"/>
-                <a:cs typeface="Times New Roman"/>
-              </a:rPr>
-              <a:t>1.08</a:t>
-            </a:r>
-            <a:endParaRPr lang="en-US" dirty="0">
-              <a:latin typeface="Times New Roman"/>
-              <a:cs typeface="Times New Roman"/>
-            </a:endParaRPr>
-          </a:p>
-        </p:txBody>
-      </p:sp>
-      <p:sp>
-        <p:nvSpPr>
-          <p:cNvPr id="52" name="TextBox 51"/>
-          <p:cNvSpPr txBox="1"/>
-          <p:nvPr/>
-        </p:nvSpPr>
-        <p:spPr>
-          <a:xfrm>
-            <a:off x="7581900" y="1364978"/>
-            <a:ext cx="1104900" cy="369332"/>
-          </a:xfrm>
-          <a:prstGeom prst="rect">
-            <a:avLst/>
-          </a:prstGeom>
-          <a:noFill/>
-        </p:spPr>
-        <p:txBody>
-          <a:bodyPr wrap="square" rtlCol="0">
-            <a:spAutoFit/>
-          </a:bodyPr>
-          <a:lstStyle/>
-          <a:p>
-            <a:pPr algn="ctr"/>
-            <a:r>
-              <a:rPr lang="en-US" dirty="0" smtClean="0">
-                <a:latin typeface="Times New Roman"/>
-                <a:cs typeface="Times New Roman"/>
-              </a:rPr>
-              <a:t>1.12</a:t>
-            </a:r>
-            <a:endParaRPr lang="en-US" dirty="0">
-              <a:latin typeface="Times New Roman"/>
-              <a:cs typeface="Times New Roman"/>
-            </a:endParaRPr>
-          </a:p>
-        </p:txBody>
-      </p:sp>
-      <p:sp>
-        <p:nvSpPr>
-          <p:cNvPr id="53" name="TextBox 52"/>
-          <p:cNvSpPr txBox="1"/>
-          <p:nvPr/>
-        </p:nvSpPr>
-        <p:spPr>
-          <a:xfrm>
-            <a:off x="2580346" y="3244334"/>
-            <a:ext cx="1104900" cy="369332"/>
-          </a:xfrm>
-          <a:prstGeom prst="rect">
-            <a:avLst/>
-          </a:prstGeom>
-          <a:noFill/>
-        </p:spPr>
-        <p:txBody>
-          <a:bodyPr wrap="square" rtlCol="0">
-            <a:spAutoFit/>
-          </a:bodyPr>
-          <a:lstStyle/>
-          <a:p>
-            <a:pPr algn="ctr"/>
-            <a:r>
-              <a:rPr lang="en-US" dirty="0" smtClean="0">
-                <a:latin typeface="Times New Roman"/>
-                <a:cs typeface="Times New Roman"/>
-              </a:rPr>
-              <a:t>1.05</a:t>
-            </a:r>
-            <a:endParaRPr lang="en-US" dirty="0">
-              <a:latin typeface="Times New Roman"/>
-              <a:cs typeface="Times New Roman"/>
-            </a:endParaRPr>
-          </a:p>
-        </p:txBody>
-      </p:sp>
-      <p:sp>
-        <p:nvSpPr>
-          <p:cNvPr id="54" name="TextBox 53"/>
-          <p:cNvSpPr txBox="1"/>
-          <p:nvPr/>
-        </p:nvSpPr>
-        <p:spPr>
-          <a:xfrm>
-            <a:off x="2573452" y="5091424"/>
-            <a:ext cx="1104900" cy="369332"/>
-          </a:xfrm>
-          <a:prstGeom prst="rect">
-            <a:avLst/>
-          </a:prstGeom>
-          <a:noFill/>
-        </p:spPr>
-        <p:txBody>
-          <a:bodyPr wrap="square" rtlCol="0">
-            <a:spAutoFit/>
-          </a:bodyPr>
-          <a:lstStyle/>
-          <a:p>
-            <a:pPr algn="ctr"/>
-            <a:r>
-              <a:rPr lang="en-US" dirty="0" smtClean="0">
-                <a:latin typeface="Times New Roman"/>
-                <a:cs typeface="Times New Roman"/>
-              </a:rPr>
-              <a:t>1.06</a:t>
-            </a:r>
-            <a:endParaRPr lang="en-US" dirty="0">
-              <a:latin typeface="Times New Roman"/>
-              <a:cs typeface="Times New Roman"/>
-            </a:endParaRPr>
-          </a:p>
-        </p:txBody>
-      </p:sp>
-      <p:sp>
-        <p:nvSpPr>
-          <p:cNvPr id="55" name="TextBox 54"/>
-          <p:cNvSpPr txBox="1"/>
-          <p:nvPr/>
-        </p:nvSpPr>
-        <p:spPr>
-          <a:xfrm>
-            <a:off x="5057682" y="3244334"/>
-            <a:ext cx="1104900" cy="369332"/>
-          </a:xfrm>
-          <a:prstGeom prst="rect">
-            <a:avLst/>
-          </a:prstGeom>
-          <a:noFill/>
-        </p:spPr>
-        <p:txBody>
-          <a:bodyPr wrap="square" rtlCol="0">
-            <a:spAutoFit/>
-          </a:bodyPr>
-          <a:lstStyle/>
-          <a:p>
-            <a:pPr algn="ctr"/>
-            <a:r>
-              <a:rPr lang="en-US" dirty="0" smtClean="0">
-                <a:latin typeface="Times New Roman"/>
-                <a:cs typeface="Times New Roman"/>
-              </a:rPr>
-              <a:t>1.09</a:t>
-            </a:r>
-            <a:endParaRPr lang="en-US" dirty="0">
-              <a:latin typeface="Times New Roman"/>
-              <a:cs typeface="Times New Roman"/>
-            </a:endParaRPr>
-          </a:p>
-        </p:txBody>
-      </p:sp>
-      <p:sp>
-        <p:nvSpPr>
-          <p:cNvPr id="56" name="TextBox 55"/>
-          <p:cNvSpPr txBox="1"/>
-          <p:nvPr/>
-        </p:nvSpPr>
-        <p:spPr>
-          <a:xfrm>
-            <a:off x="5057682" y="5091424"/>
-            <a:ext cx="1104900" cy="369332"/>
-          </a:xfrm>
-          <a:prstGeom prst="rect">
-            <a:avLst/>
-          </a:prstGeom>
-          <a:noFill/>
-        </p:spPr>
-        <p:txBody>
-          <a:bodyPr wrap="square" rtlCol="0">
-            <a:spAutoFit/>
-          </a:bodyPr>
-          <a:lstStyle/>
-          <a:p>
-            <a:pPr algn="ctr"/>
-            <a:r>
-              <a:rPr lang="en-US" dirty="0" smtClean="0">
-                <a:latin typeface="Times New Roman"/>
-                <a:cs typeface="Times New Roman"/>
-              </a:rPr>
-              <a:t>1.10</a:t>
-            </a:r>
-            <a:endParaRPr lang="en-US" dirty="0">
-              <a:latin typeface="Times New Roman"/>
-              <a:cs typeface="Times New Roman"/>
-            </a:endParaRPr>
-          </a:p>
-        </p:txBody>
-      </p:sp>
-      <p:sp>
-        <p:nvSpPr>
-          <p:cNvPr id="57" name="TextBox 56"/>
-          <p:cNvSpPr txBox="1"/>
-          <p:nvPr/>
-        </p:nvSpPr>
-        <p:spPr>
-          <a:xfrm>
-            <a:off x="7581900" y="3244334"/>
-            <a:ext cx="1104900" cy="369332"/>
-          </a:xfrm>
-          <a:prstGeom prst="rect">
-            <a:avLst/>
-          </a:prstGeom>
-          <a:noFill/>
-        </p:spPr>
-        <p:txBody>
-          <a:bodyPr wrap="square" rtlCol="0">
-            <a:spAutoFit/>
-          </a:bodyPr>
-          <a:lstStyle/>
-          <a:p>
-            <a:pPr algn="ctr"/>
-            <a:r>
-              <a:rPr lang="en-US" dirty="0" smtClean="0">
-                <a:latin typeface="Times New Roman"/>
-                <a:cs typeface="Times New Roman"/>
-              </a:rPr>
-              <a:t>1.13</a:t>
-            </a:r>
-            <a:endParaRPr lang="en-US" dirty="0">
-              <a:latin typeface="Times New Roman"/>
-              <a:cs typeface="Times New Roman"/>
-            </a:endParaRPr>
-          </a:p>
-        </p:txBody>
-      </p:sp>
-      <p:sp>
-        <p:nvSpPr>
-          <p:cNvPr id="58" name="TextBox 57"/>
-          <p:cNvSpPr txBox="1"/>
-          <p:nvPr/>
-        </p:nvSpPr>
-        <p:spPr>
-          <a:xfrm>
-            <a:off x="7581900" y="5123690"/>
-            <a:ext cx="1104900" cy="369332"/>
-          </a:xfrm>
-          <a:prstGeom prst="rect">
-            <a:avLst/>
-          </a:prstGeom>
-          <a:noFill/>
-        </p:spPr>
-        <p:txBody>
-          <a:bodyPr wrap="square" rtlCol="0">
-            <a:spAutoFit/>
-          </a:bodyPr>
-          <a:lstStyle/>
-          <a:p>
-            <a:pPr algn="ctr"/>
-            <a:r>
-              <a:rPr lang="en-US" dirty="0" smtClean="0">
-                <a:latin typeface="Times New Roman"/>
-                <a:cs typeface="Times New Roman"/>
-              </a:rPr>
-              <a:t>1.14</a:t>
-            </a:r>
-            <a:endParaRPr lang="en-US" dirty="0">
-              <a:latin typeface="Times New Roman"/>
-              <a:cs typeface="Times New Roman"/>
-            </a:endParaRPr>
-          </a:p>
-        </p:txBody>
-      </p:sp>
-      <p:sp>
-        <p:nvSpPr>
-          <p:cNvPr id="59" name="TextBox 58"/>
-          <p:cNvSpPr txBox="1"/>
-          <p:nvPr/>
-        </p:nvSpPr>
-        <p:spPr>
-          <a:xfrm>
-            <a:off x="1780947" y="2098611"/>
-            <a:ext cx="866316" cy="369332"/>
-          </a:xfrm>
-          <a:prstGeom prst="rect">
-            <a:avLst/>
-          </a:prstGeom>
-          <a:noFill/>
-        </p:spPr>
-        <p:txBody>
-          <a:bodyPr wrap="square" rtlCol="0">
-            <a:spAutoFit/>
-          </a:bodyPr>
-          <a:lstStyle/>
-          <a:p>
-            <a:pPr algn="ctr"/>
-            <a:r>
-              <a:rPr lang="en-US" dirty="0" smtClean="0">
-                <a:latin typeface="Times New Roman"/>
-                <a:cs typeface="Times New Roman"/>
-              </a:rPr>
-              <a:t>0.01</a:t>
-            </a:r>
-            <a:endParaRPr lang="en-US" dirty="0">
-              <a:latin typeface="Times New Roman"/>
-              <a:cs typeface="Times New Roman"/>
-            </a:endParaRPr>
-          </a:p>
-        </p:txBody>
-      </p:sp>
-      <p:sp>
-        <p:nvSpPr>
-          <p:cNvPr id="60" name="TextBox 59"/>
-          <p:cNvSpPr txBox="1"/>
-          <p:nvPr/>
-        </p:nvSpPr>
-        <p:spPr>
-          <a:xfrm>
-            <a:off x="4227756" y="2098611"/>
-            <a:ext cx="876300" cy="369332"/>
-          </a:xfrm>
-          <a:prstGeom prst="rect">
-            <a:avLst/>
-          </a:prstGeom>
-          <a:noFill/>
-        </p:spPr>
-        <p:txBody>
-          <a:bodyPr wrap="square" rtlCol="0">
-            <a:spAutoFit/>
-          </a:bodyPr>
-          <a:lstStyle/>
-          <a:p>
-            <a:pPr algn="ctr"/>
-            <a:r>
-              <a:rPr lang="en-US" dirty="0" smtClean="0">
-                <a:latin typeface="Times New Roman"/>
-                <a:cs typeface="Times New Roman"/>
-              </a:rPr>
-              <a:t>0.05</a:t>
-            </a:r>
-            <a:endParaRPr lang="en-US" dirty="0">
-              <a:latin typeface="Times New Roman"/>
-              <a:cs typeface="Times New Roman"/>
-            </a:endParaRPr>
-          </a:p>
-        </p:txBody>
-      </p:sp>
-      <p:sp>
-        <p:nvSpPr>
-          <p:cNvPr id="61" name="TextBox 60"/>
-          <p:cNvSpPr txBox="1"/>
-          <p:nvPr/>
-        </p:nvSpPr>
-        <p:spPr>
-          <a:xfrm>
-            <a:off x="6781800" y="2098611"/>
-            <a:ext cx="876300" cy="369332"/>
-          </a:xfrm>
-          <a:prstGeom prst="rect">
-            <a:avLst/>
-          </a:prstGeom>
-          <a:noFill/>
-        </p:spPr>
-        <p:txBody>
-          <a:bodyPr wrap="square" rtlCol="0">
-            <a:spAutoFit/>
-          </a:bodyPr>
-          <a:lstStyle/>
-          <a:p>
-            <a:pPr algn="ctr"/>
-            <a:r>
-              <a:rPr lang="en-US" dirty="0" smtClean="0">
-                <a:latin typeface="Times New Roman"/>
-                <a:cs typeface="Times New Roman"/>
-              </a:rPr>
-              <a:t>0.09</a:t>
-            </a:r>
-            <a:endParaRPr lang="en-US" dirty="0">
-              <a:latin typeface="Times New Roman"/>
-              <a:cs typeface="Times New Roman"/>
-            </a:endParaRPr>
-          </a:p>
-        </p:txBody>
-      </p:sp>
-      <p:sp>
-        <p:nvSpPr>
-          <p:cNvPr id="62" name="TextBox 61"/>
-          <p:cNvSpPr txBox="1"/>
-          <p:nvPr/>
-        </p:nvSpPr>
-        <p:spPr>
-          <a:xfrm>
-            <a:off x="1780947" y="3901389"/>
-            <a:ext cx="761769" cy="369332"/>
-          </a:xfrm>
-          <a:prstGeom prst="rect">
-            <a:avLst/>
-          </a:prstGeom>
-          <a:noFill/>
-        </p:spPr>
-        <p:txBody>
-          <a:bodyPr wrap="square" rtlCol="0">
-            <a:spAutoFit/>
-          </a:bodyPr>
-          <a:lstStyle/>
-          <a:p>
-            <a:pPr algn="ctr"/>
-            <a:r>
-              <a:rPr lang="en-US" dirty="0" smtClean="0">
-                <a:latin typeface="Times New Roman"/>
-                <a:cs typeface="Times New Roman"/>
-              </a:rPr>
-              <a:t>0.02</a:t>
-            </a:r>
-            <a:endParaRPr lang="en-US" dirty="0">
-              <a:latin typeface="Times New Roman"/>
-              <a:cs typeface="Times New Roman"/>
-            </a:endParaRPr>
-          </a:p>
-        </p:txBody>
-      </p:sp>
-      <p:sp>
-        <p:nvSpPr>
-          <p:cNvPr id="63" name="TextBox 62"/>
-          <p:cNvSpPr txBox="1"/>
-          <p:nvPr/>
-        </p:nvSpPr>
-        <p:spPr>
-          <a:xfrm>
-            <a:off x="4227756" y="3915882"/>
-            <a:ext cx="876300" cy="369332"/>
-          </a:xfrm>
-          <a:prstGeom prst="rect">
-            <a:avLst/>
-          </a:prstGeom>
-          <a:noFill/>
-        </p:spPr>
-        <p:txBody>
-          <a:bodyPr wrap="square" rtlCol="0">
-            <a:spAutoFit/>
-          </a:bodyPr>
-          <a:lstStyle/>
-          <a:p>
-            <a:pPr algn="ctr"/>
-            <a:r>
-              <a:rPr lang="en-US" dirty="0" smtClean="0">
-                <a:latin typeface="Times New Roman"/>
-                <a:cs typeface="Times New Roman"/>
-              </a:rPr>
-              <a:t>0.06</a:t>
-            </a:r>
-            <a:endParaRPr lang="en-US" dirty="0">
-              <a:latin typeface="Times New Roman"/>
-              <a:cs typeface="Times New Roman"/>
-            </a:endParaRPr>
-          </a:p>
-        </p:txBody>
-      </p:sp>
-      <p:sp>
-        <p:nvSpPr>
-          <p:cNvPr id="64" name="TextBox 63"/>
-          <p:cNvSpPr txBox="1"/>
-          <p:nvPr/>
-        </p:nvSpPr>
-        <p:spPr>
-          <a:xfrm>
-            <a:off x="6781800" y="3915882"/>
-            <a:ext cx="876300" cy="369332"/>
-          </a:xfrm>
-          <a:prstGeom prst="rect">
-            <a:avLst/>
-          </a:prstGeom>
-          <a:noFill/>
-        </p:spPr>
-        <p:txBody>
-          <a:bodyPr wrap="square" rtlCol="0">
-            <a:spAutoFit/>
-          </a:bodyPr>
-          <a:lstStyle/>
-          <a:p>
-            <a:pPr algn="ctr"/>
-            <a:r>
-              <a:rPr lang="en-US" dirty="0" smtClean="0">
-                <a:latin typeface="Times New Roman"/>
-                <a:cs typeface="Times New Roman"/>
-              </a:rPr>
-              <a:t>0.10</a:t>
-            </a:r>
-            <a:endParaRPr lang="en-US" dirty="0">
-              <a:latin typeface="Times New Roman"/>
-              <a:cs typeface="Times New Roman"/>
-            </a:endParaRPr>
-          </a:p>
-        </p:txBody>
-      </p:sp>
-      <p:sp>
-        <p:nvSpPr>
-          <p:cNvPr id="65" name="TextBox 64"/>
-          <p:cNvSpPr txBox="1"/>
-          <p:nvPr/>
-        </p:nvSpPr>
-        <p:spPr>
-          <a:xfrm>
-            <a:off x="1845178" y="5733153"/>
-            <a:ext cx="761769" cy="369332"/>
-          </a:xfrm>
-          <a:prstGeom prst="rect">
-            <a:avLst/>
-          </a:prstGeom>
-          <a:noFill/>
-        </p:spPr>
-        <p:txBody>
-          <a:bodyPr wrap="square" rtlCol="0">
-            <a:spAutoFit/>
-          </a:bodyPr>
-          <a:lstStyle/>
-          <a:p>
-            <a:pPr algn="ctr"/>
-            <a:r>
-              <a:rPr lang="en-US" dirty="0" smtClean="0">
-                <a:latin typeface="Times New Roman"/>
-                <a:cs typeface="Times New Roman"/>
-              </a:rPr>
-              <a:t>0.03</a:t>
-            </a:r>
-            <a:endParaRPr lang="en-US" dirty="0">
-              <a:latin typeface="Times New Roman"/>
-              <a:cs typeface="Times New Roman"/>
-            </a:endParaRPr>
-          </a:p>
-        </p:txBody>
-      </p:sp>
-      <p:sp>
-        <p:nvSpPr>
-          <p:cNvPr id="66" name="TextBox 65"/>
-          <p:cNvSpPr txBox="1"/>
-          <p:nvPr/>
-        </p:nvSpPr>
-        <p:spPr>
-          <a:xfrm>
-            <a:off x="4227756" y="5733153"/>
-            <a:ext cx="876300" cy="369332"/>
-          </a:xfrm>
-          <a:prstGeom prst="rect">
-            <a:avLst/>
-          </a:prstGeom>
-          <a:noFill/>
-        </p:spPr>
-        <p:txBody>
-          <a:bodyPr wrap="square" rtlCol="0">
-            <a:spAutoFit/>
-          </a:bodyPr>
-          <a:lstStyle/>
-          <a:p>
-            <a:pPr algn="ctr"/>
-            <a:r>
-              <a:rPr lang="en-US" dirty="0" smtClean="0">
-                <a:latin typeface="Times New Roman"/>
-                <a:cs typeface="Times New Roman"/>
-              </a:rPr>
-              <a:t>0.07</a:t>
-            </a:r>
-            <a:endParaRPr lang="en-US" dirty="0">
-              <a:latin typeface="Times New Roman"/>
-              <a:cs typeface="Times New Roman"/>
-            </a:endParaRPr>
-          </a:p>
-        </p:txBody>
-      </p:sp>
-      <p:sp>
-        <p:nvSpPr>
-          <p:cNvPr id="67" name="TextBox 66"/>
-          <p:cNvSpPr txBox="1"/>
-          <p:nvPr/>
-        </p:nvSpPr>
-        <p:spPr>
-          <a:xfrm>
-            <a:off x="6781800" y="5733153"/>
-            <a:ext cx="876300" cy="369332"/>
-          </a:xfrm>
-          <a:prstGeom prst="rect">
-            <a:avLst/>
-          </a:prstGeom>
-          <a:noFill/>
-        </p:spPr>
-        <p:txBody>
-          <a:bodyPr wrap="square" rtlCol="0">
-            <a:spAutoFit/>
-          </a:bodyPr>
-          <a:lstStyle/>
-          <a:p>
-            <a:pPr algn="ctr"/>
-            <a:r>
-              <a:rPr lang="en-US" dirty="0" smtClean="0">
-                <a:latin typeface="Times New Roman"/>
-                <a:cs typeface="Times New Roman"/>
-              </a:rPr>
-              <a:t>0.11</a:t>
-            </a:r>
-            <a:endParaRPr lang="en-US" dirty="0">
-              <a:latin typeface="Times New Roman"/>
-              <a:cs typeface="Times New Roman"/>
-            </a:endParaRPr>
-          </a:p>
-        </p:txBody>
-      </p:sp>
+              </a:endParaRPr>
+            </a:p>
+          </p:txBody>
+        </p:sp>
+      </p:grpSp>
     </p:spTree>
     <p:extLst>
       <p:ext uri="{BB962C8B-B14F-4D97-AF65-F5344CB8AC3E}">

</xml_diff>

<commit_message>
edit CP_build_MSTs, 4x4-array figure
</commit_message>
<xml_diff>
--- a/fall15/slidesF15/4x4-array.pptx
+++ b/fall15/slidesF15/4x4-array.pptx
@@ -288,7 +288,7 @@
           <a:p>
             <a:fld id="{C06D5029-33B5-8047-A420-BD2ECF4731DA}" type="datetimeFigureOut">
               <a:rPr lang="en-US" smtClean="0"/>
-              <a:t>10/20/15</a:t>
+              <a:t>10/21/15</a:t>
             </a:fld>
             <a:endParaRPr lang="en-US"/>
           </a:p>
@@ -458,7 +458,7 @@
           <a:p>
             <a:fld id="{C06D5029-33B5-8047-A420-BD2ECF4731DA}" type="datetimeFigureOut">
               <a:rPr lang="en-US" smtClean="0"/>
-              <a:t>10/20/15</a:t>
+              <a:t>10/21/15</a:t>
             </a:fld>
             <a:endParaRPr lang="en-US"/>
           </a:p>
@@ -638,7 +638,7 @@
           <a:p>
             <a:fld id="{C06D5029-33B5-8047-A420-BD2ECF4731DA}" type="datetimeFigureOut">
               <a:rPr lang="en-US" smtClean="0"/>
-              <a:t>10/20/15</a:t>
+              <a:t>10/21/15</a:t>
             </a:fld>
             <a:endParaRPr lang="en-US"/>
           </a:p>
@@ -808,7 +808,7 @@
           <a:p>
             <a:fld id="{C06D5029-33B5-8047-A420-BD2ECF4731DA}" type="datetimeFigureOut">
               <a:rPr lang="en-US" smtClean="0"/>
-              <a:t>10/20/15</a:t>
+              <a:t>10/21/15</a:t>
             </a:fld>
             <a:endParaRPr lang="en-US"/>
           </a:p>
@@ -1054,7 +1054,7 @@
           <a:p>
             <a:fld id="{C06D5029-33B5-8047-A420-BD2ECF4731DA}" type="datetimeFigureOut">
               <a:rPr lang="en-US" smtClean="0"/>
-              <a:t>10/20/15</a:t>
+              <a:t>10/21/15</a:t>
             </a:fld>
             <a:endParaRPr lang="en-US"/>
           </a:p>
@@ -1342,7 +1342,7 @@
           <a:p>
             <a:fld id="{C06D5029-33B5-8047-A420-BD2ECF4731DA}" type="datetimeFigureOut">
               <a:rPr lang="en-US" smtClean="0"/>
-              <a:t>10/20/15</a:t>
+              <a:t>10/21/15</a:t>
             </a:fld>
             <a:endParaRPr lang="en-US"/>
           </a:p>
@@ -1764,7 +1764,7 @@
           <a:p>
             <a:fld id="{C06D5029-33B5-8047-A420-BD2ECF4731DA}" type="datetimeFigureOut">
               <a:rPr lang="en-US" smtClean="0"/>
-              <a:t>10/20/15</a:t>
+              <a:t>10/21/15</a:t>
             </a:fld>
             <a:endParaRPr lang="en-US"/>
           </a:p>
@@ -1882,7 +1882,7 @@
           <a:p>
             <a:fld id="{C06D5029-33B5-8047-A420-BD2ECF4731DA}" type="datetimeFigureOut">
               <a:rPr lang="en-US" smtClean="0"/>
-              <a:t>10/20/15</a:t>
+              <a:t>10/21/15</a:t>
             </a:fld>
             <a:endParaRPr lang="en-US"/>
           </a:p>
@@ -1977,7 +1977,7 @@
           <a:p>
             <a:fld id="{C06D5029-33B5-8047-A420-BD2ECF4731DA}" type="datetimeFigureOut">
               <a:rPr lang="en-US" smtClean="0"/>
-              <a:t>10/20/15</a:t>
+              <a:t>10/21/15</a:t>
             </a:fld>
             <a:endParaRPr lang="en-US"/>
           </a:p>
@@ -2254,7 +2254,7 @@
           <a:p>
             <a:fld id="{C06D5029-33B5-8047-A420-BD2ECF4731DA}" type="datetimeFigureOut">
               <a:rPr lang="en-US" smtClean="0"/>
-              <a:t>10/20/15</a:t>
+              <a:t>10/21/15</a:t>
             </a:fld>
             <a:endParaRPr lang="en-US"/>
           </a:p>
@@ -2507,7 +2507,7 @@
           <a:p>
             <a:fld id="{C06D5029-33B5-8047-A420-BD2ECF4731DA}" type="datetimeFigureOut">
               <a:rPr lang="en-US" smtClean="0"/>
-              <a:t>10/20/15</a:t>
+              <a:t>10/21/15</a:t>
             </a:fld>
             <a:endParaRPr lang="en-US"/>
           </a:p>
@@ -2720,7 +2720,7 @@
           <a:p>
             <a:fld id="{C06D5029-33B5-8047-A420-BD2ECF4731DA}" type="datetimeFigureOut">
               <a:rPr lang="en-US" smtClean="0"/>
-              <a:t>10/20/15</a:t>
+              <a:t>10/21/15</a:t>
             </a:fld>
             <a:endParaRPr lang="en-US"/>
           </a:p>
@@ -4901,6 +4901,96 @@
           </p:txBody>
         </p:sp>
       </p:grpSp>
+      <p:sp>
+        <p:nvSpPr>
+          <p:cNvPr id="3" name="TextBox 2"/>
+          <p:cNvSpPr txBox="1"/>
+          <p:nvPr/>
+        </p:nvSpPr>
+        <p:spPr>
+          <a:xfrm>
+            <a:off x="2863925" y="5708626"/>
+            <a:ext cx="462687" cy="830997"/>
+          </a:xfrm>
+          <a:prstGeom prst="rect">
+            <a:avLst/>
+          </a:prstGeom>
+          <a:noFill/>
+        </p:spPr>
+        <p:txBody>
+          <a:bodyPr wrap="none" rtlCol="0">
+            <a:spAutoFit/>
+          </a:bodyPr>
+          <a:lstStyle/>
+          <a:p>
+            <a:r>
+              <a:rPr lang="en-US" sz="4800" dirty="0" smtClean="0"/>
+              <a:t>v</a:t>
+            </a:r>
+            <a:endParaRPr lang="en-US" sz="4800" dirty="0"/>
+          </a:p>
+        </p:txBody>
+      </p:sp>
+      <p:sp>
+        <p:nvSpPr>
+          <p:cNvPr id="68" name="TextBox 67"/>
+          <p:cNvSpPr txBox="1"/>
+          <p:nvPr/>
+        </p:nvSpPr>
+        <p:spPr>
+          <a:xfrm>
+            <a:off x="8153400" y="2035314"/>
+            <a:ext cx="551353" cy="707886"/>
+          </a:xfrm>
+          <a:prstGeom prst="rect">
+            <a:avLst/>
+          </a:prstGeom>
+          <a:noFill/>
+        </p:spPr>
+        <p:txBody>
+          <a:bodyPr wrap="none" rtlCol="0">
+            <a:spAutoFit/>
+          </a:bodyPr>
+          <a:lstStyle/>
+          <a:p>
+            <a:r>
+              <a:rPr lang="en-US" sz="4000" dirty="0" smtClean="0"/>
+              <a:t>w</a:t>
+            </a:r>
+            <a:endParaRPr lang="en-US" sz="4000" dirty="0"/>
+          </a:p>
+        </p:txBody>
+      </p:sp>
+      <p:sp>
+        <p:nvSpPr>
+          <p:cNvPr id="69" name="TextBox 68"/>
+          <p:cNvSpPr txBox="1"/>
+          <p:nvPr/>
+        </p:nvSpPr>
+        <p:spPr>
+          <a:xfrm>
+            <a:off x="2844728" y="1720355"/>
+            <a:ext cx="508072" cy="830997"/>
+          </a:xfrm>
+          <a:prstGeom prst="rect">
+            <a:avLst/>
+          </a:prstGeom>
+          <a:noFill/>
+        </p:spPr>
+        <p:txBody>
+          <a:bodyPr wrap="none" rtlCol="0">
+            <a:spAutoFit/>
+          </a:bodyPr>
+          <a:lstStyle/>
+          <a:p>
+            <a:r>
+              <a:rPr lang="en-US" sz="4800" dirty="0" smtClean="0"/>
+              <a:t>u</a:t>
+            </a:r>
+            <a:endParaRPr lang="en-US" sz="4800" dirty="0"/>
+          </a:p>
+        </p:txBody>
+      </p:sp>
     </p:spTree>
     <p:extLst>
       <p:ext uri="{BB962C8B-B14F-4D97-AF65-F5344CB8AC3E}">

</xml_diff>

<commit_message>
tweak slides gray-edges 4x4-array stable-optimal
</commit_message>
<xml_diff>
--- a/fall15/slidesF15/4x4-array.pptx
+++ b/fall15/slidesF15/4x4-array.pptx
@@ -288,7 +288,7 @@
           <a:p>
             <a:fld id="{C06D5029-33B5-8047-A420-BD2ECF4731DA}" type="datetimeFigureOut">
               <a:rPr lang="en-US" smtClean="0"/>
-              <a:t>10/21/15</a:t>
+              <a:t>12/29/15</a:t>
             </a:fld>
             <a:endParaRPr lang="en-US"/>
           </a:p>
@@ -458,7 +458,7 @@
           <a:p>
             <a:fld id="{C06D5029-33B5-8047-A420-BD2ECF4731DA}" type="datetimeFigureOut">
               <a:rPr lang="en-US" smtClean="0"/>
-              <a:t>10/21/15</a:t>
+              <a:t>12/29/15</a:t>
             </a:fld>
             <a:endParaRPr lang="en-US"/>
           </a:p>
@@ -638,7 +638,7 @@
           <a:p>
             <a:fld id="{C06D5029-33B5-8047-A420-BD2ECF4731DA}" type="datetimeFigureOut">
               <a:rPr lang="en-US" smtClean="0"/>
-              <a:t>10/21/15</a:t>
+              <a:t>12/29/15</a:t>
             </a:fld>
             <a:endParaRPr lang="en-US"/>
           </a:p>
@@ -808,7 +808,7 @@
           <a:p>
             <a:fld id="{C06D5029-33B5-8047-A420-BD2ECF4731DA}" type="datetimeFigureOut">
               <a:rPr lang="en-US" smtClean="0"/>
-              <a:t>10/21/15</a:t>
+              <a:t>12/29/15</a:t>
             </a:fld>
             <a:endParaRPr lang="en-US"/>
           </a:p>
@@ -1054,7 +1054,7 @@
           <a:p>
             <a:fld id="{C06D5029-33B5-8047-A420-BD2ECF4731DA}" type="datetimeFigureOut">
               <a:rPr lang="en-US" smtClean="0"/>
-              <a:t>10/21/15</a:t>
+              <a:t>12/29/15</a:t>
             </a:fld>
             <a:endParaRPr lang="en-US"/>
           </a:p>
@@ -1342,7 +1342,7 @@
           <a:p>
             <a:fld id="{C06D5029-33B5-8047-A420-BD2ECF4731DA}" type="datetimeFigureOut">
               <a:rPr lang="en-US" smtClean="0"/>
-              <a:t>10/21/15</a:t>
+              <a:t>12/29/15</a:t>
             </a:fld>
             <a:endParaRPr lang="en-US"/>
           </a:p>
@@ -1764,7 +1764,7 @@
           <a:p>
             <a:fld id="{C06D5029-33B5-8047-A420-BD2ECF4731DA}" type="datetimeFigureOut">
               <a:rPr lang="en-US" smtClean="0"/>
-              <a:t>10/21/15</a:t>
+              <a:t>12/29/15</a:t>
             </a:fld>
             <a:endParaRPr lang="en-US"/>
           </a:p>
@@ -1882,7 +1882,7 @@
           <a:p>
             <a:fld id="{C06D5029-33B5-8047-A420-BD2ECF4731DA}" type="datetimeFigureOut">
               <a:rPr lang="en-US" smtClean="0"/>
-              <a:t>10/21/15</a:t>
+              <a:t>12/29/15</a:t>
             </a:fld>
             <a:endParaRPr lang="en-US"/>
           </a:p>
@@ -1977,7 +1977,7 @@
           <a:p>
             <a:fld id="{C06D5029-33B5-8047-A420-BD2ECF4731DA}" type="datetimeFigureOut">
               <a:rPr lang="en-US" smtClean="0"/>
-              <a:t>10/21/15</a:t>
+              <a:t>12/29/15</a:t>
             </a:fld>
             <a:endParaRPr lang="en-US"/>
           </a:p>
@@ -2254,7 +2254,7 @@
           <a:p>
             <a:fld id="{C06D5029-33B5-8047-A420-BD2ECF4731DA}" type="datetimeFigureOut">
               <a:rPr lang="en-US" smtClean="0"/>
-              <a:t>10/21/15</a:t>
+              <a:t>12/29/15</a:t>
             </a:fld>
             <a:endParaRPr lang="en-US"/>
           </a:p>
@@ -2507,7 +2507,7 @@
           <a:p>
             <a:fld id="{C06D5029-33B5-8047-A420-BD2ECF4731DA}" type="datetimeFigureOut">
               <a:rPr lang="en-US" smtClean="0"/>
-              <a:t>10/21/15</a:t>
+              <a:t>12/29/15</a:t>
             </a:fld>
             <a:endParaRPr lang="en-US"/>
           </a:p>
@@ -2720,7 +2720,7 @@
           <a:p>
             <a:fld id="{C06D5029-33B5-8047-A420-BD2ECF4731DA}" type="datetimeFigureOut">
               <a:rPr lang="en-US" smtClean="0"/>
-              <a:t>10/21/15</a:t>
+              <a:t>12/29/15</a:t>
             </a:fld>
             <a:endParaRPr lang="en-US"/>
           </a:p>
@@ -4924,10 +4924,18 @@
           <a:lstStyle/>
           <a:p>
             <a:r>
-              <a:rPr lang="en-US" sz="4800" dirty="0" smtClean="0"/>
+              <a:rPr lang="en-US" sz="4800" dirty="0" smtClean="0">
+                <a:solidFill>
+                  <a:srgbClr val="FF10E4"/>
+                </a:solidFill>
+              </a:rPr>
               <a:t>v</a:t>
             </a:r>
-            <a:endParaRPr lang="en-US" sz="4800" dirty="0"/>
+            <a:endParaRPr lang="en-US" sz="4800" dirty="0">
+              <a:solidFill>
+                <a:srgbClr val="FF10E4"/>
+              </a:solidFill>
+            </a:endParaRPr>
           </a:p>
         </p:txBody>
       </p:sp>
@@ -4954,10 +4962,18 @@
           <a:lstStyle/>
           <a:p>
             <a:r>
-              <a:rPr lang="en-US" sz="4000" dirty="0" smtClean="0"/>
+              <a:rPr lang="en-US" sz="4000" dirty="0" smtClean="0">
+                <a:solidFill>
+                  <a:srgbClr val="FF10E4"/>
+                </a:solidFill>
+              </a:rPr>
               <a:t>w</a:t>
             </a:r>
-            <a:endParaRPr lang="en-US" sz="4000" dirty="0"/>
+            <a:endParaRPr lang="en-US" sz="4000" dirty="0">
+              <a:solidFill>
+                <a:srgbClr val="FF10E4"/>
+              </a:solidFill>
+            </a:endParaRPr>
           </a:p>
         </p:txBody>
       </p:sp>
@@ -4984,10 +5000,18 @@
           <a:lstStyle/>
           <a:p>
             <a:r>
-              <a:rPr lang="en-US" sz="4800" dirty="0" smtClean="0"/>
+              <a:rPr lang="en-US" sz="4800" dirty="0" smtClean="0">
+                <a:solidFill>
+                  <a:srgbClr val="FF10E4"/>
+                </a:solidFill>
+              </a:rPr>
               <a:t>u</a:t>
             </a:r>
-            <a:endParaRPr lang="en-US" sz="4800" dirty="0"/>
+            <a:endParaRPr lang="en-US" sz="4800" dirty="0">
+              <a:solidFill>
+                <a:srgbClr val="FF10E4"/>
+              </a:solidFill>
+            </a:endParaRPr>
           </a:p>
         </p:txBody>
       </p:sp>

</xml_diff>